<commit_message>
final fix thesis + update speech and slides
</commit_message>
<xml_diff>
--- a/presentation/Exploring the Use of LLMs for Agent Planning.pptx
+++ b/presentation/Exploring the Use of LLMs for Agent Planning.pptx
@@ -2,10 +2,16 @@
 <file path=ppt/presentation.xml><?xml version="1.0" encoding="utf-8"?>
 <p:presentation xmlns:a="http://schemas.openxmlformats.org/drawingml/2006/main" xmlns:r="http://schemas.openxmlformats.org/officeDocument/2006/relationships" xmlns:p="http://schemas.openxmlformats.org/presentationml/2006/main" saveSubsetFonts="1">
   <p:sldMasterIdLst>
-    <p:sldMasterId id="2147483648" r:id="rId1"/>
+    <p:sldMasterId id="2147483737" r:id="rId1"/>
   </p:sldMasterIdLst>
   <p:sldIdLst>
     <p:sldId id="256" r:id="rId2"/>
+    <p:sldId id="257" r:id="rId3"/>
+    <p:sldId id="258" r:id="rId4"/>
+    <p:sldId id="259" r:id="rId5"/>
+    <p:sldId id="260" r:id="rId6"/>
+    <p:sldId id="261" r:id="rId7"/>
+    <p:sldId id="262" r:id="rId8"/>
   </p:sldIdLst>
   <p:sldSz cx="12192000" cy="6858000"/>
   <p:notesSz cx="6858000" cy="9144000"/>
@@ -104,6 +110,11 @@
       </a:defRPr>
     </a:lvl9pPr>
   </p:defaultTextStyle>
+  <p:extLst>
+    <p:ext uri="{EFAFB233-063F-42B5-8137-9DF3F51BA10A}">
+      <p15:sldGuideLst xmlns:p15="http://schemas.microsoft.com/office/powerpoint/2012/main"/>
+    </p:ext>
+  </p:extLst>
 </p:presentation>
 </file>
 
@@ -129,7 +140,7 @@
           <p:cNvPr id="2" name="Title 1">
             <a:extLst>
               <a:ext uri="{FF2B5EF4-FFF2-40B4-BE49-F238E27FC236}">
-                <a16:creationId xmlns:a16="http://schemas.microsoft.com/office/drawing/2014/main" id="{8CEA93B3-536B-0B8B-DDD9-FB8C6E365C7D}"/>
+                <a16:creationId xmlns:a16="http://schemas.microsoft.com/office/drawing/2014/main" id="{068926BF-9275-97DB-7ED3-FA4D16F939E5}"/>
               </a:ext>
             </a:extLst>
           </p:cNvPr>
@@ -167,7 +178,7 @@
           <p:cNvPr id="3" name="Subtitle 2">
             <a:extLst>
               <a:ext uri="{FF2B5EF4-FFF2-40B4-BE49-F238E27FC236}">
-                <a16:creationId xmlns:a16="http://schemas.microsoft.com/office/drawing/2014/main" id="{60C64A83-39DA-A202-DD0C-7EACF439BB5F}"/>
+                <a16:creationId xmlns:a16="http://schemas.microsoft.com/office/drawing/2014/main" id="{9AE5D8AE-445D-1E50-7105-4FB49E9C2FA9}"/>
               </a:ext>
             </a:extLst>
           </p:cNvPr>
@@ -238,7 +249,7 @@
           <p:cNvPr id="4" name="Date Placeholder 3">
             <a:extLst>
               <a:ext uri="{FF2B5EF4-FFF2-40B4-BE49-F238E27FC236}">
-                <a16:creationId xmlns:a16="http://schemas.microsoft.com/office/drawing/2014/main" id="{806E9391-BA65-82B4-552E-F097DE3AC58B}"/>
+                <a16:creationId xmlns:a16="http://schemas.microsoft.com/office/drawing/2014/main" id="{1E8BB1E5-78CF-EA33-8DB2-F71B35F0AE24}"/>
               </a:ext>
             </a:extLst>
           </p:cNvPr>
@@ -256,7 +267,7 @@
           <a:p>
             <a:fld id="{84904564-A16B-46DE-95D6-E3007EDE1A1C}" type="datetimeFigureOut">
               <a:rPr lang="it-IT" smtClean="0"/>
-              <a:t>03/03/2025</a:t>
+              <a:t>10/03/2025</a:t>
             </a:fld>
             <a:endParaRPr lang="it-IT"/>
           </a:p>
@@ -267,7 +278,7 @@
           <p:cNvPr id="5" name="Footer Placeholder 4">
             <a:extLst>
               <a:ext uri="{FF2B5EF4-FFF2-40B4-BE49-F238E27FC236}">
-                <a16:creationId xmlns:a16="http://schemas.microsoft.com/office/drawing/2014/main" id="{49C6F060-EFA1-71F2-5288-0F5EE3006EAF}"/>
+                <a16:creationId xmlns:a16="http://schemas.microsoft.com/office/drawing/2014/main" id="{386A34E4-2545-7ECF-E00F-D314C4CB8170}"/>
               </a:ext>
             </a:extLst>
           </p:cNvPr>
@@ -292,7 +303,7 @@
           <p:cNvPr id="6" name="Slide Number Placeholder 5">
             <a:extLst>
               <a:ext uri="{FF2B5EF4-FFF2-40B4-BE49-F238E27FC236}">
-                <a16:creationId xmlns:a16="http://schemas.microsoft.com/office/drawing/2014/main" id="{17CC5506-2BDD-FF1B-B203-FAB5D375E47C}"/>
+                <a16:creationId xmlns:a16="http://schemas.microsoft.com/office/drawing/2014/main" id="{35BB2919-22F6-F8ED-84BA-C6387C00AC3F}"/>
               </a:ext>
             </a:extLst>
           </p:cNvPr>
@@ -319,7 +330,7 @@
     </p:spTree>
     <p:extLst>
       <p:ext uri="{BB962C8B-B14F-4D97-AF65-F5344CB8AC3E}">
-        <p14:creationId xmlns:p14="http://schemas.microsoft.com/office/powerpoint/2010/main" val="1594070272"/>
+        <p14:creationId xmlns:p14="http://schemas.microsoft.com/office/powerpoint/2010/main" val="2621858696"/>
       </p:ext>
     </p:extLst>
   </p:cSld>
@@ -351,7 +362,7 @@
           <p:cNvPr id="2" name="Title 1">
             <a:extLst>
               <a:ext uri="{FF2B5EF4-FFF2-40B4-BE49-F238E27FC236}">
-                <a16:creationId xmlns:a16="http://schemas.microsoft.com/office/drawing/2014/main" id="{60F42CB7-706B-CEB4-09ED-E13DA8DE4461}"/>
+                <a16:creationId xmlns:a16="http://schemas.microsoft.com/office/drawing/2014/main" id="{636CB51B-78E9-324C-81F6-A96AD9C543B4}"/>
               </a:ext>
             </a:extLst>
           </p:cNvPr>
@@ -380,7 +391,7 @@
           <p:cNvPr id="3" name="Vertical Text Placeholder 2">
             <a:extLst>
               <a:ext uri="{FF2B5EF4-FFF2-40B4-BE49-F238E27FC236}">
-                <a16:creationId xmlns:a16="http://schemas.microsoft.com/office/drawing/2014/main" id="{ED09A517-4A4B-185B-AB8D-7ABE48CA10FC}"/>
+                <a16:creationId xmlns:a16="http://schemas.microsoft.com/office/drawing/2014/main" id="{61539D26-2868-0ED8-F480-130A8213D285}"/>
               </a:ext>
             </a:extLst>
           </p:cNvPr>
@@ -438,7 +449,7 @@
           <p:cNvPr id="4" name="Date Placeholder 3">
             <a:extLst>
               <a:ext uri="{FF2B5EF4-FFF2-40B4-BE49-F238E27FC236}">
-                <a16:creationId xmlns:a16="http://schemas.microsoft.com/office/drawing/2014/main" id="{45E87AF1-C202-4815-5C06-FEE1EADBD596}"/>
+                <a16:creationId xmlns:a16="http://schemas.microsoft.com/office/drawing/2014/main" id="{F55515C3-7D55-7653-CF42-3054202DBFDF}"/>
               </a:ext>
             </a:extLst>
           </p:cNvPr>
@@ -456,7 +467,7 @@
           <a:p>
             <a:fld id="{84904564-A16B-46DE-95D6-E3007EDE1A1C}" type="datetimeFigureOut">
               <a:rPr lang="it-IT" smtClean="0"/>
-              <a:t>03/03/2025</a:t>
+              <a:t>10/03/2025</a:t>
             </a:fld>
             <a:endParaRPr lang="it-IT"/>
           </a:p>
@@ -467,7 +478,7 @@
           <p:cNvPr id="5" name="Footer Placeholder 4">
             <a:extLst>
               <a:ext uri="{FF2B5EF4-FFF2-40B4-BE49-F238E27FC236}">
-                <a16:creationId xmlns:a16="http://schemas.microsoft.com/office/drawing/2014/main" id="{DCCEC1D6-622F-F6CF-7DE7-2F2383A62F28}"/>
+                <a16:creationId xmlns:a16="http://schemas.microsoft.com/office/drawing/2014/main" id="{573469FD-18B7-FC0B-F10F-766E680ED62B}"/>
               </a:ext>
             </a:extLst>
           </p:cNvPr>
@@ -492,7 +503,7 @@
           <p:cNvPr id="6" name="Slide Number Placeholder 5">
             <a:extLst>
               <a:ext uri="{FF2B5EF4-FFF2-40B4-BE49-F238E27FC236}">
-                <a16:creationId xmlns:a16="http://schemas.microsoft.com/office/drawing/2014/main" id="{66239CB9-863A-6923-5227-79C4838C7F7B}"/>
+                <a16:creationId xmlns:a16="http://schemas.microsoft.com/office/drawing/2014/main" id="{632105AF-FB11-3A87-BCA8-A719D3A804D6}"/>
               </a:ext>
             </a:extLst>
           </p:cNvPr>
@@ -519,7 +530,7 @@
     </p:spTree>
     <p:extLst>
       <p:ext uri="{BB962C8B-B14F-4D97-AF65-F5344CB8AC3E}">
-        <p14:creationId xmlns:p14="http://schemas.microsoft.com/office/powerpoint/2010/main" val="1961834591"/>
+        <p14:creationId xmlns:p14="http://schemas.microsoft.com/office/powerpoint/2010/main" val="52875759"/>
       </p:ext>
     </p:extLst>
   </p:cSld>
@@ -551,7 +562,7 @@
           <p:cNvPr id="2" name="Vertical Title 1">
             <a:extLst>
               <a:ext uri="{FF2B5EF4-FFF2-40B4-BE49-F238E27FC236}">
-                <a16:creationId xmlns:a16="http://schemas.microsoft.com/office/drawing/2014/main" id="{521A3DC8-6F4B-9F7D-E27D-90574564DE14}"/>
+                <a16:creationId xmlns:a16="http://schemas.microsoft.com/office/drawing/2014/main" id="{EC8AC4C1-655F-6CB2-7170-13722C6DC326}"/>
               </a:ext>
             </a:extLst>
           </p:cNvPr>
@@ -585,7 +596,7 @@
           <p:cNvPr id="3" name="Vertical Text Placeholder 2">
             <a:extLst>
               <a:ext uri="{FF2B5EF4-FFF2-40B4-BE49-F238E27FC236}">
-                <a16:creationId xmlns:a16="http://schemas.microsoft.com/office/drawing/2014/main" id="{9528D9ED-4474-9A9F-BDAD-E146694E4C57}"/>
+                <a16:creationId xmlns:a16="http://schemas.microsoft.com/office/drawing/2014/main" id="{25357C8E-E04D-CE3E-11F4-1386EE82946F}"/>
               </a:ext>
             </a:extLst>
           </p:cNvPr>
@@ -648,7 +659,7 @@
           <p:cNvPr id="4" name="Date Placeholder 3">
             <a:extLst>
               <a:ext uri="{FF2B5EF4-FFF2-40B4-BE49-F238E27FC236}">
-                <a16:creationId xmlns:a16="http://schemas.microsoft.com/office/drawing/2014/main" id="{112308C8-AF28-4CB0-B114-49E752531029}"/>
+                <a16:creationId xmlns:a16="http://schemas.microsoft.com/office/drawing/2014/main" id="{1686B33B-3CF0-3423-F837-E25F239CE868}"/>
               </a:ext>
             </a:extLst>
           </p:cNvPr>
@@ -666,7 +677,7 @@
           <a:p>
             <a:fld id="{84904564-A16B-46DE-95D6-E3007EDE1A1C}" type="datetimeFigureOut">
               <a:rPr lang="it-IT" smtClean="0"/>
-              <a:t>03/03/2025</a:t>
+              <a:t>10/03/2025</a:t>
             </a:fld>
             <a:endParaRPr lang="it-IT"/>
           </a:p>
@@ -677,7 +688,7 @@
           <p:cNvPr id="5" name="Footer Placeholder 4">
             <a:extLst>
               <a:ext uri="{FF2B5EF4-FFF2-40B4-BE49-F238E27FC236}">
-                <a16:creationId xmlns:a16="http://schemas.microsoft.com/office/drawing/2014/main" id="{2B2DB29E-EFBD-3F7E-00B8-8F1564E14A8C}"/>
+                <a16:creationId xmlns:a16="http://schemas.microsoft.com/office/drawing/2014/main" id="{CA0899AC-0B17-9BA8-95D8-0554A4ECD0FA}"/>
               </a:ext>
             </a:extLst>
           </p:cNvPr>
@@ -702,7 +713,7 @@
           <p:cNvPr id="6" name="Slide Number Placeholder 5">
             <a:extLst>
               <a:ext uri="{FF2B5EF4-FFF2-40B4-BE49-F238E27FC236}">
-                <a16:creationId xmlns:a16="http://schemas.microsoft.com/office/drawing/2014/main" id="{565B9D30-E6EB-5805-A9A9-626DDA8E5993}"/>
+                <a16:creationId xmlns:a16="http://schemas.microsoft.com/office/drawing/2014/main" id="{ACD41635-867E-5452-ADAB-CDD0FFC2D3C3}"/>
               </a:ext>
             </a:extLst>
           </p:cNvPr>
@@ -729,7 +740,7 @@
     </p:spTree>
     <p:extLst>
       <p:ext uri="{BB962C8B-B14F-4D97-AF65-F5344CB8AC3E}">
-        <p14:creationId xmlns:p14="http://schemas.microsoft.com/office/powerpoint/2010/main" val="368286203"/>
+        <p14:creationId xmlns:p14="http://schemas.microsoft.com/office/powerpoint/2010/main" val="2248477116"/>
       </p:ext>
     </p:extLst>
   </p:cSld>
@@ -761,7 +772,7 @@
           <p:cNvPr id="2" name="Title 1">
             <a:extLst>
               <a:ext uri="{FF2B5EF4-FFF2-40B4-BE49-F238E27FC236}">
-                <a16:creationId xmlns:a16="http://schemas.microsoft.com/office/drawing/2014/main" id="{80D38AB7-8CF7-65FB-E916-4A6B2CB18C0F}"/>
+                <a16:creationId xmlns:a16="http://schemas.microsoft.com/office/drawing/2014/main" id="{B2E2B660-6244-7C5B-C4CB-B368F965D72C}"/>
               </a:ext>
             </a:extLst>
           </p:cNvPr>
@@ -790,7 +801,7 @@
           <p:cNvPr id="3" name="Content Placeholder 2">
             <a:extLst>
               <a:ext uri="{FF2B5EF4-FFF2-40B4-BE49-F238E27FC236}">
-                <a16:creationId xmlns:a16="http://schemas.microsoft.com/office/drawing/2014/main" id="{59B21318-3344-F365-6006-526942F27795}"/>
+                <a16:creationId xmlns:a16="http://schemas.microsoft.com/office/drawing/2014/main" id="{D9069501-0272-DECC-2BF1-AEFEE1219FC9}"/>
               </a:ext>
             </a:extLst>
           </p:cNvPr>
@@ -848,7 +859,7 @@
           <p:cNvPr id="4" name="Date Placeholder 3">
             <a:extLst>
               <a:ext uri="{FF2B5EF4-FFF2-40B4-BE49-F238E27FC236}">
-                <a16:creationId xmlns:a16="http://schemas.microsoft.com/office/drawing/2014/main" id="{72D054C9-34F7-8F42-44D3-3092F998023F}"/>
+                <a16:creationId xmlns:a16="http://schemas.microsoft.com/office/drawing/2014/main" id="{BC2AFEB5-4A62-2E53-BC1B-939403AB98B4}"/>
               </a:ext>
             </a:extLst>
           </p:cNvPr>
@@ -866,7 +877,7 @@
           <a:p>
             <a:fld id="{84904564-A16B-46DE-95D6-E3007EDE1A1C}" type="datetimeFigureOut">
               <a:rPr lang="it-IT" smtClean="0"/>
-              <a:t>03/03/2025</a:t>
+              <a:t>10/03/2025</a:t>
             </a:fld>
             <a:endParaRPr lang="it-IT"/>
           </a:p>
@@ -877,7 +888,7 @@
           <p:cNvPr id="5" name="Footer Placeholder 4">
             <a:extLst>
               <a:ext uri="{FF2B5EF4-FFF2-40B4-BE49-F238E27FC236}">
-                <a16:creationId xmlns:a16="http://schemas.microsoft.com/office/drawing/2014/main" id="{33514EE9-1B3C-A89F-2FD9-3418F3F26756}"/>
+                <a16:creationId xmlns:a16="http://schemas.microsoft.com/office/drawing/2014/main" id="{E42D0CB9-69EC-BCD9-20C5-EC8C8BC12FD7}"/>
               </a:ext>
             </a:extLst>
           </p:cNvPr>
@@ -902,7 +913,7 @@
           <p:cNvPr id="6" name="Slide Number Placeholder 5">
             <a:extLst>
               <a:ext uri="{FF2B5EF4-FFF2-40B4-BE49-F238E27FC236}">
-                <a16:creationId xmlns:a16="http://schemas.microsoft.com/office/drawing/2014/main" id="{7B604B05-659A-CD6B-CA36-4C76F389F73A}"/>
+                <a16:creationId xmlns:a16="http://schemas.microsoft.com/office/drawing/2014/main" id="{A8BB6242-9256-CD00-FC94-87BFB221EA0C}"/>
               </a:ext>
             </a:extLst>
           </p:cNvPr>
@@ -929,7 +940,7 @@
     </p:spTree>
     <p:extLst>
       <p:ext uri="{BB962C8B-B14F-4D97-AF65-F5344CB8AC3E}">
-        <p14:creationId xmlns:p14="http://schemas.microsoft.com/office/powerpoint/2010/main" val="1256293939"/>
+        <p14:creationId xmlns:p14="http://schemas.microsoft.com/office/powerpoint/2010/main" val="3716231633"/>
       </p:ext>
     </p:extLst>
   </p:cSld>
@@ -961,7 +972,7 @@
           <p:cNvPr id="2" name="Title 1">
             <a:extLst>
               <a:ext uri="{FF2B5EF4-FFF2-40B4-BE49-F238E27FC236}">
-                <a16:creationId xmlns:a16="http://schemas.microsoft.com/office/drawing/2014/main" id="{9F9138DB-404D-8C18-A18A-337F187AE36F}"/>
+                <a16:creationId xmlns:a16="http://schemas.microsoft.com/office/drawing/2014/main" id="{4B89611A-345F-82AB-6AD9-D67F40794600}"/>
               </a:ext>
             </a:extLst>
           </p:cNvPr>
@@ -999,7 +1010,7 @@
           <p:cNvPr id="3" name="Text Placeholder 2">
             <a:extLst>
               <a:ext uri="{FF2B5EF4-FFF2-40B4-BE49-F238E27FC236}">
-                <a16:creationId xmlns:a16="http://schemas.microsoft.com/office/drawing/2014/main" id="{86248849-F52E-2A73-70DF-49603160A85C}"/>
+                <a16:creationId xmlns:a16="http://schemas.microsoft.com/office/drawing/2014/main" id="{4CC61374-701F-3D78-E18E-F78BFFDC768B}"/>
               </a:ext>
             </a:extLst>
           </p:cNvPr>
@@ -1124,7 +1135,7 @@
           <p:cNvPr id="4" name="Date Placeholder 3">
             <a:extLst>
               <a:ext uri="{FF2B5EF4-FFF2-40B4-BE49-F238E27FC236}">
-                <a16:creationId xmlns:a16="http://schemas.microsoft.com/office/drawing/2014/main" id="{4CCD9473-C06D-BB10-84F8-143FB882E52A}"/>
+                <a16:creationId xmlns:a16="http://schemas.microsoft.com/office/drawing/2014/main" id="{56E4F9CC-C7F8-6257-9000-247091C92625}"/>
               </a:ext>
             </a:extLst>
           </p:cNvPr>
@@ -1142,7 +1153,7 @@
           <a:p>
             <a:fld id="{84904564-A16B-46DE-95D6-E3007EDE1A1C}" type="datetimeFigureOut">
               <a:rPr lang="it-IT" smtClean="0"/>
-              <a:t>03/03/2025</a:t>
+              <a:t>10/03/2025</a:t>
             </a:fld>
             <a:endParaRPr lang="it-IT"/>
           </a:p>
@@ -1153,7 +1164,7 @@
           <p:cNvPr id="5" name="Footer Placeholder 4">
             <a:extLst>
               <a:ext uri="{FF2B5EF4-FFF2-40B4-BE49-F238E27FC236}">
-                <a16:creationId xmlns:a16="http://schemas.microsoft.com/office/drawing/2014/main" id="{29085205-9976-F34A-7763-5C40FFE31F01}"/>
+                <a16:creationId xmlns:a16="http://schemas.microsoft.com/office/drawing/2014/main" id="{CF492F4C-B19B-8235-AF28-9C8DC7599DD7}"/>
               </a:ext>
             </a:extLst>
           </p:cNvPr>
@@ -1178,7 +1189,7 @@
           <p:cNvPr id="6" name="Slide Number Placeholder 5">
             <a:extLst>
               <a:ext uri="{FF2B5EF4-FFF2-40B4-BE49-F238E27FC236}">
-                <a16:creationId xmlns:a16="http://schemas.microsoft.com/office/drawing/2014/main" id="{2390D946-8F69-A485-64FB-5B8CB60FAC12}"/>
+                <a16:creationId xmlns:a16="http://schemas.microsoft.com/office/drawing/2014/main" id="{DABCCB21-21B9-B5C6-C97C-142D8196165C}"/>
               </a:ext>
             </a:extLst>
           </p:cNvPr>
@@ -1205,7 +1216,7 @@
     </p:spTree>
     <p:extLst>
       <p:ext uri="{BB962C8B-B14F-4D97-AF65-F5344CB8AC3E}">
-        <p14:creationId xmlns:p14="http://schemas.microsoft.com/office/powerpoint/2010/main" val="4010341081"/>
+        <p14:creationId xmlns:p14="http://schemas.microsoft.com/office/powerpoint/2010/main" val="1152327993"/>
       </p:ext>
     </p:extLst>
   </p:cSld>
@@ -1237,7 +1248,7 @@
           <p:cNvPr id="2" name="Title 1">
             <a:extLst>
               <a:ext uri="{FF2B5EF4-FFF2-40B4-BE49-F238E27FC236}">
-                <a16:creationId xmlns:a16="http://schemas.microsoft.com/office/drawing/2014/main" id="{293386A7-9690-FA57-77D0-9A3F1261AB20}"/>
+                <a16:creationId xmlns:a16="http://schemas.microsoft.com/office/drawing/2014/main" id="{2E603BAE-7951-E2AF-177F-102C1D7BCF4A}"/>
               </a:ext>
             </a:extLst>
           </p:cNvPr>
@@ -1266,7 +1277,7 @@
           <p:cNvPr id="3" name="Content Placeholder 2">
             <a:extLst>
               <a:ext uri="{FF2B5EF4-FFF2-40B4-BE49-F238E27FC236}">
-                <a16:creationId xmlns:a16="http://schemas.microsoft.com/office/drawing/2014/main" id="{D69A0DB1-8D48-7CBA-2E46-E7BB472E366F}"/>
+                <a16:creationId xmlns:a16="http://schemas.microsoft.com/office/drawing/2014/main" id="{0E5C4DD0-1A85-8BFA-7FE5-E26DD42EF94A}"/>
               </a:ext>
             </a:extLst>
           </p:cNvPr>
@@ -1329,7 +1340,7 @@
           <p:cNvPr id="4" name="Content Placeholder 3">
             <a:extLst>
               <a:ext uri="{FF2B5EF4-FFF2-40B4-BE49-F238E27FC236}">
-                <a16:creationId xmlns:a16="http://schemas.microsoft.com/office/drawing/2014/main" id="{E76099F3-3536-E9E2-0F32-19BF84DDC3EE}"/>
+                <a16:creationId xmlns:a16="http://schemas.microsoft.com/office/drawing/2014/main" id="{F023C413-6B63-D9B0-ECCE-B9B9940C5B6B}"/>
               </a:ext>
             </a:extLst>
           </p:cNvPr>
@@ -1392,7 +1403,7 @@
           <p:cNvPr id="5" name="Date Placeholder 4">
             <a:extLst>
               <a:ext uri="{FF2B5EF4-FFF2-40B4-BE49-F238E27FC236}">
-                <a16:creationId xmlns:a16="http://schemas.microsoft.com/office/drawing/2014/main" id="{6B6FBFE9-5624-F451-FEAE-350F560681B8}"/>
+                <a16:creationId xmlns:a16="http://schemas.microsoft.com/office/drawing/2014/main" id="{6109ABA6-A4E9-BD4A-003A-2270E6918FDD}"/>
               </a:ext>
             </a:extLst>
           </p:cNvPr>
@@ -1410,7 +1421,7 @@
           <a:p>
             <a:fld id="{84904564-A16B-46DE-95D6-E3007EDE1A1C}" type="datetimeFigureOut">
               <a:rPr lang="it-IT" smtClean="0"/>
-              <a:t>03/03/2025</a:t>
+              <a:t>10/03/2025</a:t>
             </a:fld>
             <a:endParaRPr lang="it-IT"/>
           </a:p>
@@ -1421,7 +1432,7 @@
           <p:cNvPr id="6" name="Footer Placeholder 5">
             <a:extLst>
               <a:ext uri="{FF2B5EF4-FFF2-40B4-BE49-F238E27FC236}">
-                <a16:creationId xmlns:a16="http://schemas.microsoft.com/office/drawing/2014/main" id="{21394A54-EBD7-2984-2F8D-4704B47610F6}"/>
+                <a16:creationId xmlns:a16="http://schemas.microsoft.com/office/drawing/2014/main" id="{1C64BEC5-24F5-8378-BF7F-7728A9FA6E02}"/>
               </a:ext>
             </a:extLst>
           </p:cNvPr>
@@ -1446,7 +1457,7 @@
           <p:cNvPr id="7" name="Slide Number Placeholder 6">
             <a:extLst>
               <a:ext uri="{FF2B5EF4-FFF2-40B4-BE49-F238E27FC236}">
-                <a16:creationId xmlns:a16="http://schemas.microsoft.com/office/drawing/2014/main" id="{FAF5DFC1-C2FA-B82B-CB63-ADB0F1233108}"/>
+                <a16:creationId xmlns:a16="http://schemas.microsoft.com/office/drawing/2014/main" id="{01EAB4F6-9FA2-ED99-DCB8-794FDCBA75FD}"/>
               </a:ext>
             </a:extLst>
           </p:cNvPr>
@@ -1473,7 +1484,7 @@
     </p:spTree>
     <p:extLst>
       <p:ext uri="{BB962C8B-B14F-4D97-AF65-F5344CB8AC3E}">
-        <p14:creationId xmlns:p14="http://schemas.microsoft.com/office/powerpoint/2010/main" val="1681393261"/>
+        <p14:creationId xmlns:p14="http://schemas.microsoft.com/office/powerpoint/2010/main" val="3202752055"/>
       </p:ext>
     </p:extLst>
   </p:cSld>
@@ -1505,7 +1516,7 @@
           <p:cNvPr id="2" name="Title 1">
             <a:extLst>
               <a:ext uri="{FF2B5EF4-FFF2-40B4-BE49-F238E27FC236}">
-                <a16:creationId xmlns:a16="http://schemas.microsoft.com/office/drawing/2014/main" id="{BAF5285C-F1BC-C068-2021-82581744536A}"/>
+                <a16:creationId xmlns:a16="http://schemas.microsoft.com/office/drawing/2014/main" id="{F69CC198-E715-0E60-B6F3-5848E9A082DD}"/>
               </a:ext>
             </a:extLst>
           </p:cNvPr>
@@ -1539,7 +1550,7 @@
           <p:cNvPr id="3" name="Text Placeholder 2">
             <a:extLst>
               <a:ext uri="{FF2B5EF4-FFF2-40B4-BE49-F238E27FC236}">
-                <a16:creationId xmlns:a16="http://schemas.microsoft.com/office/drawing/2014/main" id="{3CCD3CB2-728B-96D3-758A-809D4ABAF07B}"/>
+                <a16:creationId xmlns:a16="http://schemas.microsoft.com/office/drawing/2014/main" id="{E0387194-8861-6F30-CA3D-0DB72A68CB77}"/>
               </a:ext>
             </a:extLst>
           </p:cNvPr>
@@ -1610,7 +1621,7 @@
           <p:cNvPr id="4" name="Content Placeholder 3">
             <a:extLst>
               <a:ext uri="{FF2B5EF4-FFF2-40B4-BE49-F238E27FC236}">
-                <a16:creationId xmlns:a16="http://schemas.microsoft.com/office/drawing/2014/main" id="{888C24BB-F50A-2CC7-84CE-7268703FC55B}"/>
+                <a16:creationId xmlns:a16="http://schemas.microsoft.com/office/drawing/2014/main" id="{B1CE7066-538A-1E22-AF33-5746161E5580}"/>
               </a:ext>
             </a:extLst>
           </p:cNvPr>
@@ -1673,7 +1684,7 @@
           <p:cNvPr id="5" name="Text Placeholder 4">
             <a:extLst>
               <a:ext uri="{FF2B5EF4-FFF2-40B4-BE49-F238E27FC236}">
-                <a16:creationId xmlns:a16="http://schemas.microsoft.com/office/drawing/2014/main" id="{30B3904A-D157-50C7-451B-B85C231414CE}"/>
+                <a16:creationId xmlns:a16="http://schemas.microsoft.com/office/drawing/2014/main" id="{76224D2B-ADC7-5CA6-18C5-9421EC1DD6A3}"/>
               </a:ext>
             </a:extLst>
           </p:cNvPr>
@@ -1744,7 +1755,7 @@
           <p:cNvPr id="6" name="Content Placeholder 5">
             <a:extLst>
               <a:ext uri="{FF2B5EF4-FFF2-40B4-BE49-F238E27FC236}">
-                <a16:creationId xmlns:a16="http://schemas.microsoft.com/office/drawing/2014/main" id="{A6EC7A2A-1B88-B9EE-C0EF-1043BBE4DACB}"/>
+                <a16:creationId xmlns:a16="http://schemas.microsoft.com/office/drawing/2014/main" id="{7626C14E-2657-2D46-3BAE-3EFDA053352C}"/>
               </a:ext>
             </a:extLst>
           </p:cNvPr>
@@ -1807,7 +1818,7 @@
           <p:cNvPr id="7" name="Date Placeholder 6">
             <a:extLst>
               <a:ext uri="{FF2B5EF4-FFF2-40B4-BE49-F238E27FC236}">
-                <a16:creationId xmlns:a16="http://schemas.microsoft.com/office/drawing/2014/main" id="{56AA6781-3123-31CB-6F54-537F4662E598}"/>
+                <a16:creationId xmlns:a16="http://schemas.microsoft.com/office/drawing/2014/main" id="{8CEECEBF-57E3-411A-B11D-BF83D085AA2E}"/>
               </a:ext>
             </a:extLst>
           </p:cNvPr>
@@ -1825,7 +1836,7 @@
           <a:p>
             <a:fld id="{84904564-A16B-46DE-95D6-E3007EDE1A1C}" type="datetimeFigureOut">
               <a:rPr lang="it-IT" smtClean="0"/>
-              <a:t>03/03/2025</a:t>
+              <a:t>10/03/2025</a:t>
             </a:fld>
             <a:endParaRPr lang="it-IT"/>
           </a:p>
@@ -1836,7 +1847,7 @@
           <p:cNvPr id="8" name="Footer Placeholder 7">
             <a:extLst>
               <a:ext uri="{FF2B5EF4-FFF2-40B4-BE49-F238E27FC236}">
-                <a16:creationId xmlns:a16="http://schemas.microsoft.com/office/drawing/2014/main" id="{F86E3673-4BD2-F7E2-92A4-7FCE12D86AD4}"/>
+                <a16:creationId xmlns:a16="http://schemas.microsoft.com/office/drawing/2014/main" id="{FF480015-DC90-CF7F-003A-A6DA8385A240}"/>
               </a:ext>
             </a:extLst>
           </p:cNvPr>
@@ -1861,7 +1872,7 @@
           <p:cNvPr id="9" name="Slide Number Placeholder 8">
             <a:extLst>
               <a:ext uri="{FF2B5EF4-FFF2-40B4-BE49-F238E27FC236}">
-                <a16:creationId xmlns:a16="http://schemas.microsoft.com/office/drawing/2014/main" id="{46A21E25-18C4-7FEB-BC20-4759B3751084}"/>
+                <a16:creationId xmlns:a16="http://schemas.microsoft.com/office/drawing/2014/main" id="{F5822F0A-8782-B16E-27DD-80A2BD1B4897}"/>
               </a:ext>
             </a:extLst>
           </p:cNvPr>
@@ -1888,7 +1899,7 @@
     </p:spTree>
     <p:extLst>
       <p:ext uri="{BB962C8B-B14F-4D97-AF65-F5344CB8AC3E}">
-        <p14:creationId xmlns:p14="http://schemas.microsoft.com/office/powerpoint/2010/main" val="3346462398"/>
+        <p14:creationId xmlns:p14="http://schemas.microsoft.com/office/powerpoint/2010/main" val="4136159158"/>
       </p:ext>
     </p:extLst>
   </p:cSld>
@@ -1920,7 +1931,7 @@
           <p:cNvPr id="2" name="Title 1">
             <a:extLst>
               <a:ext uri="{FF2B5EF4-FFF2-40B4-BE49-F238E27FC236}">
-                <a16:creationId xmlns:a16="http://schemas.microsoft.com/office/drawing/2014/main" id="{F9F5AF44-F3B4-D14D-F5DB-917452A06DDF}"/>
+                <a16:creationId xmlns:a16="http://schemas.microsoft.com/office/drawing/2014/main" id="{7F14464A-F68A-E43B-451B-9A1CCB162E2A}"/>
               </a:ext>
             </a:extLst>
           </p:cNvPr>
@@ -1949,7 +1960,7 @@
           <p:cNvPr id="3" name="Date Placeholder 2">
             <a:extLst>
               <a:ext uri="{FF2B5EF4-FFF2-40B4-BE49-F238E27FC236}">
-                <a16:creationId xmlns:a16="http://schemas.microsoft.com/office/drawing/2014/main" id="{190C18B0-AD83-03B8-953F-D2E20BF2AB68}"/>
+                <a16:creationId xmlns:a16="http://schemas.microsoft.com/office/drawing/2014/main" id="{AF65FAA0-3BD9-741A-5D83-4D62BD5F6779}"/>
               </a:ext>
             </a:extLst>
           </p:cNvPr>
@@ -1967,7 +1978,7 @@
           <a:p>
             <a:fld id="{84904564-A16B-46DE-95D6-E3007EDE1A1C}" type="datetimeFigureOut">
               <a:rPr lang="it-IT" smtClean="0"/>
-              <a:t>03/03/2025</a:t>
+              <a:t>10/03/2025</a:t>
             </a:fld>
             <a:endParaRPr lang="it-IT"/>
           </a:p>
@@ -1978,7 +1989,7 @@
           <p:cNvPr id="4" name="Footer Placeholder 3">
             <a:extLst>
               <a:ext uri="{FF2B5EF4-FFF2-40B4-BE49-F238E27FC236}">
-                <a16:creationId xmlns:a16="http://schemas.microsoft.com/office/drawing/2014/main" id="{CEB6DFA8-752F-C71C-32DC-EED6375A0FB3}"/>
+                <a16:creationId xmlns:a16="http://schemas.microsoft.com/office/drawing/2014/main" id="{4556B75C-72BE-7838-50DC-3EE34CE310DC}"/>
               </a:ext>
             </a:extLst>
           </p:cNvPr>
@@ -2003,7 +2014,7 @@
           <p:cNvPr id="5" name="Slide Number Placeholder 4">
             <a:extLst>
               <a:ext uri="{FF2B5EF4-FFF2-40B4-BE49-F238E27FC236}">
-                <a16:creationId xmlns:a16="http://schemas.microsoft.com/office/drawing/2014/main" id="{B3F62E4D-6908-D480-8610-27CBA875EF78}"/>
+                <a16:creationId xmlns:a16="http://schemas.microsoft.com/office/drawing/2014/main" id="{2C77547A-D5AE-941A-E92B-9E9DE7D94652}"/>
               </a:ext>
             </a:extLst>
           </p:cNvPr>
@@ -2030,7 +2041,7 @@
     </p:spTree>
     <p:extLst>
       <p:ext uri="{BB962C8B-B14F-4D97-AF65-F5344CB8AC3E}">
-        <p14:creationId xmlns:p14="http://schemas.microsoft.com/office/powerpoint/2010/main" val="1467498205"/>
+        <p14:creationId xmlns:p14="http://schemas.microsoft.com/office/powerpoint/2010/main" val="4143434992"/>
       </p:ext>
     </p:extLst>
   </p:cSld>
@@ -2062,7 +2073,7 @@
           <p:cNvPr id="2" name="Date Placeholder 1">
             <a:extLst>
               <a:ext uri="{FF2B5EF4-FFF2-40B4-BE49-F238E27FC236}">
-                <a16:creationId xmlns:a16="http://schemas.microsoft.com/office/drawing/2014/main" id="{210AE79D-E586-E179-4516-D014B7F41FF7}"/>
+                <a16:creationId xmlns:a16="http://schemas.microsoft.com/office/drawing/2014/main" id="{7B32144D-2170-0371-6189-124BEA936DE5}"/>
               </a:ext>
             </a:extLst>
           </p:cNvPr>
@@ -2080,7 +2091,7 @@
           <a:p>
             <a:fld id="{84904564-A16B-46DE-95D6-E3007EDE1A1C}" type="datetimeFigureOut">
               <a:rPr lang="it-IT" smtClean="0"/>
-              <a:t>03/03/2025</a:t>
+              <a:t>10/03/2025</a:t>
             </a:fld>
             <a:endParaRPr lang="it-IT"/>
           </a:p>
@@ -2091,7 +2102,7 @@
           <p:cNvPr id="3" name="Footer Placeholder 2">
             <a:extLst>
               <a:ext uri="{FF2B5EF4-FFF2-40B4-BE49-F238E27FC236}">
-                <a16:creationId xmlns:a16="http://schemas.microsoft.com/office/drawing/2014/main" id="{DF5CE4B2-7DF8-014B-145F-DEC0B9673970}"/>
+                <a16:creationId xmlns:a16="http://schemas.microsoft.com/office/drawing/2014/main" id="{D55524AE-3F5E-2AC5-11F7-1EC9C626201D}"/>
               </a:ext>
             </a:extLst>
           </p:cNvPr>
@@ -2116,7 +2127,7 @@
           <p:cNvPr id="4" name="Slide Number Placeholder 3">
             <a:extLst>
               <a:ext uri="{FF2B5EF4-FFF2-40B4-BE49-F238E27FC236}">
-                <a16:creationId xmlns:a16="http://schemas.microsoft.com/office/drawing/2014/main" id="{BBAF2718-E59F-0DF7-457A-4D9E1DF42655}"/>
+                <a16:creationId xmlns:a16="http://schemas.microsoft.com/office/drawing/2014/main" id="{A0803AF5-78DB-860B-36BD-C32DE8817D60}"/>
               </a:ext>
             </a:extLst>
           </p:cNvPr>
@@ -2143,7 +2154,7 @@
     </p:spTree>
     <p:extLst>
       <p:ext uri="{BB962C8B-B14F-4D97-AF65-F5344CB8AC3E}">
-        <p14:creationId xmlns:p14="http://schemas.microsoft.com/office/powerpoint/2010/main" val="3117907615"/>
+        <p14:creationId xmlns:p14="http://schemas.microsoft.com/office/powerpoint/2010/main" val="3846546117"/>
       </p:ext>
     </p:extLst>
   </p:cSld>
@@ -2175,7 +2186,7 @@
           <p:cNvPr id="2" name="Title 1">
             <a:extLst>
               <a:ext uri="{FF2B5EF4-FFF2-40B4-BE49-F238E27FC236}">
-                <a16:creationId xmlns:a16="http://schemas.microsoft.com/office/drawing/2014/main" id="{9EB055B4-EA90-11F6-F03B-FA1D2EC95A01}"/>
+                <a16:creationId xmlns:a16="http://schemas.microsoft.com/office/drawing/2014/main" id="{C7D67C7C-D4AE-BAB3-A9D0-B34456133F17}"/>
               </a:ext>
             </a:extLst>
           </p:cNvPr>
@@ -2213,7 +2224,7 @@
           <p:cNvPr id="3" name="Content Placeholder 2">
             <a:extLst>
               <a:ext uri="{FF2B5EF4-FFF2-40B4-BE49-F238E27FC236}">
-                <a16:creationId xmlns:a16="http://schemas.microsoft.com/office/drawing/2014/main" id="{B75C6879-B3DA-ACB2-C34C-06E9E74157C4}"/>
+                <a16:creationId xmlns:a16="http://schemas.microsoft.com/office/drawing/2014/main" id="{EA627816-1B63-75A2-B370-065961B10939}"/>
               </a:ext>
             </a:extLst>
           </p:cNvPr>
@@ -2304,7 +2315,7 @@
           <p:cNvPr id="4" name="Text Placeholder 3">
             <a:extLst>
               <a:ext uri="{FF2B5EF4-FFF2-40B4-BE49-F238E27FC236}">
-                <a16:creationId xmlns:a16="http://schemas.microsoft.com/office/drawing/2014/main" id="{E27C1039-8030-84B2-2A65-1F05EA9E7E6C}"/>
+                <a16:creationId xmlns:a16="http://schemas.microsoft.com/office/drawing/2014/main" id="{284E111C-860B-006C-AF9F-8FD51066E37F}"/>
               </a:ext>
             </a:extLst>
           </p:cNvPr>
@@ -2375,7 +2386,7 @@
           <p:cNvPr id="5" name="Date Placeholder 4">
             <a:extLst>
               <a:ext uri="{FF2B5EF4-FFF2-40B4-BE49-F238E27FC236}">
-                <a16:creationId xmlns:a16="http://schemas.microsoft.com/office/drawing/2014/main" id="{C8D85A4C-4DBC-FFAD-2CCF-753F37FB4409}"/>
+                <a16:creationId xmlns:a16="http://schemas.microsoft.com/office/drawing/2014/main" id="{16D4AF3D-CFF7-5C6F-5C98-E7408E03A244}"/>
               </a:ext>
             </a:extLst>
           </p:cNvPr>
@@ -2393,7 +2404,7 @@
           <a:p>
             <a:fld id="{84904564-A16B-46DE-95D6-E3007EDE1A1C}" type="datetimeFigureOut">
               <a:rPr lang="it-IT" smtClean="0"/>
-              <a:t>03/03/2025</a:t>
+              <a:t>10/03/2025</a:t>
             </a:fld>
             <a:endParaRPr lang="it-IT"/>
           </a:p>
@@ -2404,7 +2415,7 @@
           <p:cNvPr id="6" name="Footer Placeholder 5">
             <a:extLst>
               <a:ext uri="{FF2B5EF4-FFF2-40B4-BE49-F238E27FC236}">
-                <a16:creationId xmlns:a16="http://schemas.microsoft.com/office/drawing/2014/main" id="{F3346A37-ABA2-D1DD-7F12-783CF82E4C4B}"/>
+                <a16:creationId xmlns:a16="http://schemas.microsoft.com/office/drawing/2014/main" id="{CC576BA5-E7E3-7E0B-5B77-A6C9E5C9E610}"/>
               </a:ext>
             </a:extLst>
           </p:cNvPr>
@@ -2429,7 +2440,7 @@
           <p:cNvPr id="7" name="Slide Number Placeholder 6">
             <a:extLst>
               <a:ext uri="{FF2B5EF4-FFF2-40B4-BE49-F238E27FC236}">
-                <a16:creationId xmlns:a16="http://schemas.microsoft.com/office/drawing/2014/main" id="{BD51C86F-F777-C99A-9C02-0F0CBF45BE86}"/>
+                <a16:creationId xmlns:a16="http://schemas.microsoft.com/office/drawing/2014/main" id="{5FBEC810-49A2-74AA-0569-41AB02F1C695}"/>
               </a:ext>
             </a:extLst>
           </p:cNvPr>
@@ -2456,7 +2467,7 @@
     </p:spTree>
     <p:extLst>
       <p:ext uri="{BB962C8B-B14F-4D97-AF65-F5344CB8AC3E}">
-        <p14:creationId xmlns:p14="http://schemas.microsoft.com/office/powerpoint/2010/main" val="743749953"/>
+        <p14:creationId xmlns:p14="http://schemas.microsoft.com/office/powerpoint/2010/main" val="68296843"/>
       </p:ext>
     </p:extLst>
   </p:cSld>
@@ -2488,7 +2499,7 @@
           <p:cNvPr id="2" name="Title 1">
             <a:extLst>
               <a:ext uri="{FF2B5EF4-FFF2-40B4-BE49-F238E27FC236}">
-                <a16:creationId xmlns:a16="http://schemas.microsoft.com/office/drawing/2014/main" id="{D99788A8-E3BB-51C6-0D0A-9D5233629FB3}"/>
+                <a16:creationId xmlns:a16="http://schemas.microsoft.com/office/drawing/2014/main" id="{18E3EAFA-1EFA-959E-2C06-A55ACFEF94DA}"/>
               </a:ext>
             </a:extLst>
           </p:cNvPr>
@@ -2526,7 +2537,7 @@
           <p:cNvPr id="3" name="Picture Placeholder 2">
             <a:extLst>
               <a:ext uri="{FF2B5EF4-FFF2-40B4-BE49-F238E27FC236}">
-                <a16:creationId xmlns:a16="http://schemas.microsoft.com/office/drawing/2014/main" id="{32F44B2C-B5EF-A797-5D82-79D1B72CF2CF}"/>
+                <a16:creationId xmlns:a16="http://schemas.microsoft.com/office/drawing/2014/main" id="{9687FA1F-AF15-B1EB-EE9D-BA3CA6630BD8}"/>
               </a:ext>
             </a:extLst>
           </p:cNvPr>
@@ -2593,7 +2604,7 @@
           <p:cNvPr id="4" name="Text Placeholder 3">
             <a:extLst>
               <a:ext uri="{FF2B5EF4-FFF2-40B4-BE49-F238E27FC236}">
-                <a16:creationId xmlns:a16="http://schemas.microsoft.com/office/drawing/2014/main" id="{4FFA7D2E-19CD-9544-E6BB-6CD264FD7DE1}"/>
+                <a16:creationId xmlns:a16="http://schemas.microsoft.com/office/drawing/2014/main" id="{75526654-B5DE-5126-7949-463688D99894}"/>
               </a:ext>
             </a:extLst>
           </p:cNvPr>
@@ -2664,7 +2675,7 @@
           <p:cNvPr id="5" name="Date Placeholder 4">
             <a:extLst>
               <a:ext uri="{FF2B5EF4-FFF2-40B4-BE49-F238E27FC236}">
-                <a16:creationId xmlns:a16="http://schemas.microsoft.com/office/drawing/2014/main" id="{4EC89697-421C-18D5-8350-D896661D56D0}"/>
+                <a16:creationId xmlns:a16="http://schemas.microsoft.com/office/drawing/2014/main" id="{93C5D7B7-8067-3645-7499-E5A916770F4C}"/>
               </a:ext>
             </a:extLst>
           </p:cNvPr>
@@ -2682,7 +2693,7 @@
           <a:p>
             <a:fld id="{84904564-A16B-46DE-95D6-E3007EDE1A1C}" type="datetimeFigureOut">
               <a:rPr lang="it-IT" smtClean="0"/>
-              <a:t>03/03/2025</a:t>
+              <a:t>10/03/2025</a:t>
             </a:fld>
             <a:endParaRPr lang="it-IT"/>
           </a:p>
@@ -2693,7 +2704,7 @@
           <p:cNvPr id="6" name="Footer Placeholder 5">
             <a:extLst>
               <a:ext uri="{FF2B5EF4-FFF2-40B4-BE49-F238E27FC236}">
-                <a16:creationId xmlns:a16="http://schemas.microsoft.com/office/drawing/2014/main" id="{D22D655C-C4D7-2292-60A7-14F506E6F7A2}"/>
+                <a16:creationId xmlns:a16="http://schemas.microsoft.com/office/drawing/2014/main" id="{0BF58FC0-1664-712C-BA81-1DA29052227D}"/>
               </a:ext>
             </a:extLst>
           </p:cNvPr>
@@ -2718,7 +2729,7 @@
           <p:cNvPr id="7" name="Slide Number Placeholder 6">
             <a:extLst>
               <a:ext uri="{FF2B5EF4-FFF2-40B4-BE49-F238E27FC236}">
-                <a16:creationId xmlns:a16="http://schemas.microsoft.com/office/drawing/2014/main" id="{BBD46129-513D-B34B-0775-FF9D73785515}"/>
+                <a16:creationId xmlns:a16="http://schemas.microsoft.com/office/drawing/2014/main" id="{DDE7FAD5-6827-3C93-7AAD-0ADCD96B5EFD}"/>
               </a:ext>
             </a:extLst>
           </p:cNvPr>
@@ -2745,7 +2756,7 @@
     </p:spTree>
     <p:extLst>
       <p:ext uri="{BB962C8B-B14F-4D97-AF65-F5344CB8AC3E}">
-        <p14:creationId xmlns:p14="http://schemas.microsoft.com/office/powerpoint/2010/main" val="3322732811"/>
+        <p14:creationId xmlns:p14="http://schemas.microsoft.com/office/powerpoint/2010/main" val="1924668803"/>
       </p:ext>
     </p:extLst>
   </p:cSld>
@@ -2782,7 +2793,7 @@
           <p:cNvPr id="2" name="Title Placeholder 1">
             <a:extLst>
               <a:ext uri="{FF2B5EF4-FFF2-40B4-BE49-F238E27FC236}">
-                <a16:creationId xmlns:a16="http://schemas.microsoft.com/office/drawing/2014/main" id="{779CC250-FE9C-D927-3675-3A092D7E088C}"/>
+                <a16:creationId xmlns:a16="http://schemas.microsoft.com/office/drawing/2014/main" id="{C2CB2B26-E1E1-46D5-7C46-F9CF9C7B4316}"/>
               </a:ext>
             </a:extLst>
           </p:cNvPr>
@@ -2821,7 +2832,7 @@
           <p:cNvPr id="3" name="Text Placeholder 2">
             <a:extLst>
               <a:ext uri="{FF2B5EF4-FFF2-40B4-BE49-F238E27FC236}">
-                <a16:creationId xmlns:a16="http://schemas.microsoft.com/office/drawing/2014/main" id="{FCCCF05E-5C77-64E7-F7CE-8A37B04A2A96}"/>
+                <a16:creationId xmlns:a16="http://schemas.microsoft.com/office/drawing/2014/main" id="{FA8E740E-9B4B-D63F-D39D-57417A3DF2A3}"/>
               </a:ext>
             </a:extLst>
           </p:cNvPr>
@@ -2889,7 +2900,7 @@
           <p:cNvPr id="4" name="Date Placeholder 3">
             <a:extLst>
               <a:ext uri="{FF2B5EF4-FFF2-40B4-BE49-F238E27FC236}">
-                <a16:creationId xmlns:a16="http://schemas.microsoft.com/office/drawing/2014/main" id="{5461C990-C191-DBF2-2372-136E799592BE}"/>
+                <a16:creationId xmlns:a16="http://schemas.microsoft.com/office/drawing/2014/main" id="{857D67D1-120D-8269-8511-9921D695A35B}"/>
               </a:ext>
             </a:extLst>
           </p:cNvPr>
@@ -2925,7 +2936,7 @@
           <a:p>
             <a:fld id="{84904564-A16B-46DE-95D6-E3007EDE1A1C}" type="datetimeFigureOut">
               <a:rPr lang="it-IT" smtClean="0"/>
-              <a:t>03/03/2025</a:t>
+              <a:t>10/03/2025</a:t>
             </a:fld>
             <a:endParaRPr lang="it-IT"/>
           </a:p>
@@ -2936,7 +2947,7 @@
           <p:cNvPr id="5" name="Footer Placeholder 4">
             <a:extLst>
               <a:ext uri="{FF2B5EF4-FFF2-40B4-BE49-F238E27FC236}">
-                <a16:creationId xmlns:a16="http://schemas.microsoft.com/office/drawing/2014/main" id="{A1B55BF6-68A6-BED7-7196-29069DDE36AF}"/>
+                <a16:creationId xmlns:a16="http://schemas.microsoft.com/office/drawing/2014/main" id="{9C710B2B-D9E7-95F6-0653-78DD7179C5FC}"/>
               </a:ext>
             </a:extLst>
           </p:cNvPr>
@@ -2979,7 +2990,7 @@
           <p:cNvPr id="6" name="Slide Number Placeholder 5">
             <a:extLst>
               <a:ext uri="{FF2B5EF4-FFF2-40B4-BE49-F238E27FC236}">
-                <a16:creationId xmlns:a16="http://schemas.microsoft.com/office/drawing/2014/main" id="{D457B94F-2FD5-6612-95C9-832B381A6AD6}"/>
+                <a16:creationId xmlns:a16="http://schemas.microsoft.com/office/drawing/2014/main" id="{0B0A587C-CEA0-DDFC-56A0-9E03314FB470}"/>
               </a:ext>
             </a:extLst>
           </p:cNvPr>
@@ -3024,23 +3035,23 @@
     </p:spTree>
     <p:extLst>
       <p:ext uri="{BB962C8B-B14F-4D97-AF65-F5344CB8AC3E}">
-        <p14:creationId xmlns:p14="http://schemas.microsoft.com/office/powerpoint/2010/main" val="2426231533"/>
+        <p14:creationId xmlns:p14="http://schemas.microsoft.com/office/powerpoint/2010/main" val="944772436"/>
       </p:ext>
     </p:extLst>
   </p:cSld>
   <p:clrMap bg1="lt1" tx1="dk1" bg2="lt2" tx2="dk2" accent1="accent1" accent2="accent2" accent3="accent3" accent4="accent4" accent5="accent5" accent6="accent6" hlink="hlink" folHlink="folHlink"/>
   <p:sldLayoutIdLst>
-    <p:sldLayoutId id="2147483649" r:id="rId1"/>
-    <p:sldLayoutId id="2147483650" r:id="rId2"/>
-    <p:sldLayoutId id="2147483651" r:id="rId3"/>
-    <p:sldLayoutId id="2147483652" r:id="rId4"/>
-    <p:sldLayoutId id="2147483653" r:id="rId5"/>
-    <p:sldLayoutId id="2147483654" r:id="rId6"/>
-    <p:sldLayoutId id="2147483655" r:id="rId7"/>
-    <p:sldLayoutId id="2147483656" r:id="rId8"/>
-    <p:sldLayoutId id="2147483657" r:id="rId9"/>
-    <p:sldLayoutId id="2147483658" r:id="rId10"/>
-    <p:sldLayoutId id="2147483659" r:id="rId11"/>
+    <p:sldLayoutId id="2147483738" r:id="rId1"/>
+    <p:sldLayoutId id="2147483739" r:id="rId2"/>
+    <p:sldLayoutId id="2147483740" r:id="rId3"/>
+    <p:sldLayoutId id="2147483741" r:id="rId4"/>
+    <p:sldLayoutId id="2147483742" r:id="rId5"/>
+    <p:sldLayoutId id="2147483743" r:id="rId6"/>
+    <p:sldLayoutId id="2147483744" r:id="rId7"/>
+    <p:sldLayoutId id="2147483745" r:id="rId8"/>
+    <p:sldLayoutId id="2147483746" r:id="rId9"/>
+    <p:sldLayoutId id="2147483747" r:id="rId10"/>
+    <p:sldLayoutId id="2147483748" r:id="rId11"/>
   </p:sldLayoutIdLst>
   <p:txStyles>
     <p:titleStyle>
@@ -3328,6 +3339,32 @@
 <file path=ppt/slides/slide1.xml><?xml version="1.0" encoding="utf-8"?>
 <p:sld xmlns:a="http://schemas.openxmlformats.org/drawingml/2006/main" xmlns:r="http://schemas.openxmlformats.org/officeDocument/2006/relationships" xmlns:p="http://schemas.openxmlformats.org/presentationml/2006/main">
   <p:cSld>
+    <p:bg>
+      <p:bgPr>
+        <a:gradFill rotWithShape="1">
+          <a:gsLst>
+            <a:gs pos="0">
+              <a:schemeClr val="bg2">
+                <a:tint val="90000"/>
+                <a:satMod val="92000"/>
+                <a:lumMod val="120000"/>
+              </a:schemeClr>
+            </a:gs>
+            <a:gs pos="100000">
+              <a:schemeClr val="bg2">
+                <a:shade val="98000"/>
+                <a:satMod val="120000"/>
+                <a:lumMod val="98000"/>
+              </a:schemeClr>
+            </a:gs>
+          </a:gsLst>
+          <a:path path="circle">
+            <a:fillToRect l="50000" t="50000" r="100000" b="100000"/>
+          </a:path>
+        </a:gradFill>
+        <a:effectLst/>
+      </p:bgPr>
+    </p:bg>
     <p:spTree>
       <p:nvGrpSpPr>
         <p:cNvPr id="1" name=""/>
@@ -3366,10 +3403,10 @@
           <a:lstStyle/>
           <a:p>
             <a:r>
-              <a:rPr lang="en-US" dirty="0"/>
+              <a:rPr lang="en-US"/>
               <a:t>Exploring the Use of LLMs for Agent Planning</a:t>
             </a:r>
-            <a:endParaRPr lang="it-IT" dirty="0"/>
+            <a:endParaRPr lang="it-IT"/>
           </a:p>
         </p:txBody>
       </p:sp>
@@ -3391,14 +3428,16 @@
         </p:nvSpPr>
         <p:spPr/>
         <p:txBody>
-          <a:bodyPr/>
-          <a:lstStyle/>
-          <a:p>
-            <a:r>
-              <a:rPr lang="en-US" dirty="0"/>
+          <a:bodyPr>
+            <a:normAutofit/>
+          </a:bodyPr>
+          <a:lstStyle/>
+          <a:p>
+            <a:r>
+              <a:rPr lang="en-US"/>
               <a:t>Strengths and Weaknesses</a:t>
             </a:r>
-            <a:endParaRPr lang="it-IT" dirty="0"/>
+            <a:endParaRPr lang="it-IT"/>
           </a:p>
         </p:txBody>
       </p:sp>
@@ -3406,6 +3445,976 @@
     <p:extLst>
       <p:ext uri="{BB962C8B-B14F-4D97-AF65-F5344CB8AC3E}">
         <p14:creationId xmlns:p14="http://schemas.microsoft.com/office/powerpoint/2010/main" val="959678063"/>
+      </p:ext>
+    </p:extLst>
+  </p:cSld>
+  <p:clrMapOvr>
+    <a:masterClrMapping/>
+  </p:clrMapOvr>
+  <p:timing>
+    <p:tnLst>
+      <p:par>
+        <p:cTn id="1" dur="indefinite" restart="never" nodeType="tmRoot">
+          <p:childTnLst>
+            <p:seq concurrent="1" nextAc="seek">
+              <p:cTn id="2" dur="indefinite" nodeType="mainSeq">
+                <p:childTnLst>
+                  <p:par>
+                    <p:cTn id="3" fill="hold">
+                      <p:stCondLst>
+                        <p:cond delay="indefinite"/>
+                        <p:cond evt="onBegin" delay="0">
+                          <p:tn val="2"/>
+                        </p:cond>
+                      </p:stCondLst>
+                      <p:childTnLst>
+                        <p:par>
+                          <p:cTn id="4" fill="hold">
+                            <p:stCondLst>
+                              <p:cond delay="0"/>
+                            </p:stCondLst>
+                            <p:childTnLst>
+                              <p:par>
+                                <p:cTn id="5" presetID="10" presetClass="entr" presetSubtype="0" fill="hold" grpId="0" nodeType="withEffect">
+                                  <p:stCondLst>
+                                    <p:cond delay="1000"/>
+                                  </p:stCondLst>
+                                  <p:iterate>
+                                    <p:tmPct val="10000"/>
+                                  </p:iterate>
+                                  <p:childTnLst>
+                                    <p:set>
+                                      <p:cBhvr>
+                                        <p:cTn id="6" dur="1" fill="hold">
+                                          <p:stCondLst>
+                                            <p:cond delay="0"/>
+                                          </p:stCondLst>
+                                        </p:cTn>
+                                        <p:tgtEl>
+                                          <p:spTgt spid="2"/>
+                                        </p:tgtEl>
+                                        <p:attrNameLst>
+                                          <p:attrName>style.visibility</p:attrName>
+                                        </p:attrNameLst>
+                                      </p:cBhvr>
+                                      <p:to>
+                                        <p:strVal val="visible"/>
+                                      </p:to>
+                                    </p:set>
+                                    <p:animEffect transition="in" filter="fade">
+                                      <p:cBhvr>
+                                        <p:cTn id="7" dur="700"/>
+                                        <p:tgtEl>
+                                          <p:spTgt spid="2"/>
+                                        </p:tgtEl>
+                                      </p:cBhvr>
+                                    </p:animEffect>
+                                  </p:childTnLst>
+                                </p:cTn>
+                              </p:par>
+                              <p:par>
+                                <p:cTn id="8" presetID="10" presetClass="entr" presetSubtype="0" fill="hold" grpId="0" nodeType="withEffect">
+                                  <p:stCondLst>
+                                    <p:cond delay="1500"/>
+                                  </p:stCondLst>
+                                  <p:iterate>
+                                    <p:tmPct val="10000"/>
+                                  </p:iterate>
+                                  <p:childTnLst>
+                                    <p:set>
+                                      <p:cBhvr>
+                                        <p:cTn id="9" dur="1" fill="hold">
+                                          <p:stCondLst>
+                                            <p:cond delay="0"/>
+                                          </p:stCondLst>
+                                        </p:cTn>
+                                        <p:tgtEl>
+                                          <p:spTgt spid="3">
+                                            <p:txEl>
+                                              <p:pRg st="0" end="0"/>
+                                            </p:txEl>
+                                          </p:spTgt>
+                                        </p:tgtEl>
+                                        <p:attrNameLst>
+                                          <p:attrName>style.visibility</p:attrName>
+                                        </p:attrNameLst>
+                                      </p:cBhvr>
+                                      <p:to>
+                                        <p:strVal val="visible"/>
+                                      </p:to>
+                                    </p:set>
+                                    <p:animEffect transition="in" filter="fade">
+                                      <p:cBhvr>
+                                        <p:cTn id="10" dur="700"/>
+                                        <p:tgtEl>
+                                          <p:spTgt spid="3">
+                                            <p:txEl>
+                                              <p:pRg st="0" end="0"/>
+                                            </p:txEl>
+                                          </p:spTgt>
+                                        </p:tgtEl>
+                                      </p:cBhvr>
+                                    </p:animEffect>
+                                  </p:childTnLst>
+                                </p:cTn>
+                              </p:par>
+                            </p:childTnLst>
+                          </p:cTn>
+                        </p:par>
+                      </p:childTnLst>
+                    </p:cTn>
+                  </p:par>
+                </p:childTnLst>
+              </p:cTn>
+              <p:prevCondLst>
+                <p:cond evt="onPrev" delay="0">
+                  <p:tgtEl>
+                    <p:sldTgt/>
+                  </p:tgtEl>
+                </p:cond>
+              </p:prevCondLst>
+              <p:nextCondLst>
+                <p:cond evt="onNext" delay="0">
+                  <p:tgtEl>
+                    <p:sldTgt/>
+                  </p:tgtEl>
+                </p:cond>
+              </p:nextCondLst>
+            </p:seq>
+          </p:childTnLst>
+        </p:cTn>
+      </p:par>
+    </p:tnLst>
+    <p:bldLst>
+      <p:bldP spid="2" grpId="0"/>
+      <p:bldP spid="3" grpId="0" build="p"/>
+    </p:bldLst>
+  </p:timing>
+</p:sld>
+</file>
+
+<file path=ppt/slides/slide2.xml><?xml version="1.0" encoding="utf-8"?>
+<p:sld xmlns:a="http://schemas.openxmlformats.org/drawingml/2006/main" xmlns:r="http://schemas.openxmlformats.org/officeDocument/2006/relationships" xmlns:p="http://schemas.openxmlformats.org/presentationml/2006/main">
+  <p:cSld>
+    <p:spTree>
+      <p:nvGrpSpPr>
+        <p:cNvPr id="1" name=""/>
+        <p:cNvGrpSpPr/>
+        <p:nvPr/>
+      </p:nvGrpSpPr>
+      <p:grpSpPr>
+        <a:xfrm>
+          <a:off x="0" y="0"/>
+          <a:ext cx="0" cy="0"/>
+          <a:chOff x="0" y="0"/>
+          <a:chExt cx="0" cy="0"/>
+        </a:xfrm>
+      </p:grpSpPr>
+      <p:sp>
+        <p:nvSpPr>
+          <p:cNvPr id="2" name="Title 1">
+            <a:extLst>
+              <a:ext uri="{FF2B5EF4-FFF2-40B4-BE49-F238E27FC236}">
+                <a16:creationId xmlns:a16="http://schemas.microsoft.com/office/drawing/2014/main" id="{1E21284A-5758-A9E1-6E49-2F0F7A8E7FC4}"/>
+              </a:ext>
+            </a:extLst>
+          </p:cNvPr>
+          <p:cNvSpPr>
+            <a:spLocks noGrp="1"/>
+          </p:cNvSpPr>
+          <p:nvPr>
+            <p:ph type="title"/>
+          </p:nvPr>
+        </p:nvSpPr>
+        <p:spPr/>
+        <p:txBody>
+          <a:bodyPr/>
+          <a:lstStyle/>
+          <a:p>
+            <a:r>
+              <a:rPr lang="en-US" dirty="0"/>
+              <a:t>Context</a:t>
+            </a:r>
+            <a:endParaRPr lang="it-IT" dirty="0"/>
+          </a:p>
+        </p:txBody>
+      </p:sp>
+      <p:sp>
+        <p:nvSpPr>
+          <p:cNvPr id="3" name="Content Placeholder 2">
+            <a:extLst>
+              <a:ext uri="{FF2B5EF4-FFF2-40B4-BE49-F238E27FC236}">
+                <a16:creationId xmlns:a16="http://schemas.microsoft.com/office/drawing/2014/main" id="{8B58F24F-B36A-A588-7543-AAF93FDD52EF}"/>
+              </a:ext>
+            </a:extLst>
+          </p:cNvPr>
+          <p:cNvSpPr>
+            <a:spLocks noGrp="1"/>
+          </p:cNvSpPr>
+          <p:nvPr>
+            <p:ph idx="1"/>
+          </p:nvPr>
+        </p:nvSpPr>
+        <p:spPr/>
+        <p:txBody>
+          <a:bodyPr/>
+          <a:lstStyle/>
+          <a:p>
+            <a:r>
+              <a:rPr lang="en-US" dirty="0"/>
+              <a:t>AI</a:t>
+            </a:r>
+          </a:p>
+          <a:p>
+            <a:r>
+              <a:rPr lang="en-US" dirty="0"/>
+              <a:t>LLM</a:t>
+            </a:r>
+          </a:p>
+          <a:p>
+            <a:r>
+              <a:rPr lang="en-US" dirty="0"/>
+              <a:t>LLM Planning</a:t>
+            </a:r>
+          </a:p>
+        </p:txBody>
+      </p:sp>
+    </p:spTree>
+    <p:extLst>
+      <p:ext uri="{BB962C8B-B14F-4D97-AF65-F5344CB8AC3E}">
+        <p14:creationId xmlns:p14="http://schemas.microsoft.com/office/powerpoint/2010/main" val="3063508011"/>
+      </p:ext>
+    </p:extLst>
+  </p:cSld>
+  <p:clrMapOvr>
+    <a:masterClrMapping/>
+  </p:clrMapOvr>
+</p:sld>
+</file>
+
+<file path=ppt/slides/slide3.xml><?xml version="1.0" encoding="utf-8"?>
+<p:sld xmlns:a="http://schemas.openxmlformats.org/drawingml/2006/main" xmlns:r="http://schemas.openxmlformats.org/officeDocument/2006/relationships" xmlns:p="http://schemas.openxmlformats.org/presentationml/2006/main">
+  <p:cSld>
+    <p:spTree>
+      <p:nvGrpSpPr>
+        <p:cNvPr id="1" name=""/>
+        <p:cNvGrpSpPr/>
+        <p:nvPr/>
+      </p:nvGrpSpPr>
+      <p:grpSpPr>
+        <a:xfrm>
+          <a:off x="0" y="0"/>
+          <a:ext cx="0" cy="0"/>
+          <a:chOff x="0" y="0"/>
+          <a:chExt cx="0" cy="0"/>
+        </a:xfrm>
+      </p:grpSpPr>
+      <p:sp>
+        <p:nvSpPr>
+          <p:cNvPr id="2" name="Title 1">
+            <a:extLst>
+              <a:ext uri="{FF2B5EF4-FFF2-40B4-BE49-F238E27FC236}">
+                <a16:creationId xmlns:a16="http://schemas.microsoft.com/office/drawing/2014/main" id="{09442480-F70F-BBE7-F9D9-85AD7D4A8A57}"/>
+              </a:ext>
+            </a:extLst>
+          </p:cNvPr>
+          <p:cNvSpPr>
+            <a:spLocks noGrp="1"/>
+          </p:cNvSpPr>
+          <p:nvPr>
+            <p:ph type="title"/>
+          </p:nvPr>
+        </p:nvSpPr>
+        <p:spPr/>
+        <p:txBody>
+          <a:bodyPr/>
+          <a:lstStyle/>
+          <a:p>
+            <a:r>
+              <a:rPr lang="en-US" dirty="0"/>
+              <a:t>Research Questions</a:t>
+            </a:r>
+            <a:endParaRPr lang="it-IT" dirty="0"/>
+          </a:p>
+        </p:txBody>
+      </p:sp>
+      <p:sp>
+        <p:nvSpPr>
+          <p:cNvPr id="3" name="Content Placeholder 2">
+            <a:extLst>
+              <a:ext uri="{FF2B5EF4-FFF2-40B4-BE49-F238E27FC236}">
+                <a16:creationId xmlns:a16="http://schemas.microsoft.com/office/drawing/2014/main" id="{44543A94-C08A-7FB5-2DDA-AD8AF3CF7E58}"/>
+              </a:ext>
+            </a:extLst>
+          </p:cNvPr>
+          <p:cNvSpPr>
+            <a:spLocks noGrp="1"/>
+          </p:cNvSpPr>
+          <p:nvPr>
+            <p:ph idx="1"/>
+          </p:nvPr>
+        </p:nvSpPr>
+        <p:spPr/>
+        <p:txBody>
+          <a:bodyPr/>
+          <a:lstStyle/>
+          <a:p>
+            <a:r>
+              <a:rPr lang="en-US" b="0" dirty="0">
+                <a:solidFill>
+                  <a:srgbClr val="000000"/>
+                </a:solidFill>
+                <a:effectLst/>
+                <a:latin typeface="Consolas" panose="020B0609020204030204" pitchFamily="49" charset="0"/>
+              </a:rPr>
+              <a:t>Can an LLM, without additional training or frameworks, effectively plan and navigate in an unknown environment?</a:t>
+            </a:r>
+          </a:p>
+          <a:p>
+            <a:r>
+              <a:rPr lang="en-US" b="0" dirty="0">
+                <a:solidFill>
+                  <a:srgbClr val="000000"/>
+                </a:solidFill>
+                <a:effectLst/>
+                <a:latin typeface="Consolas" panose="020B0609020204030204" pitchFamily="49" charset="0"/>
+              </a:rPr>
+              <a:t>evaluate how well LLMs can make sequential decisions in real-time environments</a:t>
+            </a:r>
+          </a:p>
+          <a:p>
+            <a:endParaRPr lang="it-IT" dirty="0"/>
+          </a:p>
+        </p:txBody>
+      </p:sp>
+    </p:spTree>
+    <p:extLst>
+      <p:ext uri="{BB962C8B-B14F-4D97-AF65-F5344CB8AC3E}">
+        <p14:creationId xmlns:p14="http://schemas.microsoft.com/office/powerpoint/2010/main" val="3081350896"/>
+      </p:ext>
+    </p:extLst>
+  </p:cSld>
+  <p:clrMapOvr>
+    <a:masterClrMapping/>
+  </p:clrMapOvr>
+</p:sld>
+</file>
+
+<file path=ppt/slides/slide4.xml><?xml version="1.0" encoding="utf-8"?>
+<p:sld xmlns:a="http://schemas.openxmlformats.org/drawingml/2006/main" xmlns:r="http://schemas.openxmlformats.org/officeDocument/2006/relationships" xmlns:p="http://schemas.openxmlformats.org/presentationml/2006/main">
+  <p:cSld>
+    <p:spTree>
+      <p:nvGrpSpPr>
+        <p:cNvPr id="1" name=""/>
+        <p:cNvGrpSpPr/>
+        <p:nvPr/>
+      </p:nvGrpSpPr>
+      <p:grpSpPr>
+        <a:xfrm>
+          <a:off x="0" y="0"/>
+          <a:ext cx="0" cy="0"/>
+          <a:chOff x="0" y="0"/>
+          <a:chExt cx="0" cy="0"/>
+        </a:xfrm>
+      </p:grpSpPr>
+      <p:sp>
+        <p:nvSpPr>
+          <p:cNvPr id="2" name="Title 1">
+            <a:extLst>
+              <a:ext uri="{FF2B5EF4-FFF2-40B4-BE49-F238E27FC236}">
+                <a16:creationId xmlns:a16="http://schemas.microsoft.com/office/drawing/2014/main" id="{A3BD5117-7868-512B-F72D-0F3387E4F6AC}"/>
+              </a:ext>
+            </a:extLst>
+          </p:cNvPr>
+          <p:cNvSpPr>
+            <a:spLocks noGrp="1"/>
+          </p:cNvSpPr>
+          <p:nvPr>
+            <p:ph type="title"/>
+          </p:nvPr>
+        </p:nvSpPr>
+        <p:spPr/>
+        <p:txBody>
+          <a:bodyPr/>
+          <a:lstStyle/>
+          <a:p>
+            <a:r>
+              <a:rPr lang="en-US" dirty="0"/>
+              <a:t>Experiment Setting</a:t>
+            </a:r>
+            <a:endParaRPr lang="it-IT" dirty="0"/>
+          </a:p>
+        </p:txBody>
+      </p:sp>
+      <p:sp>
+        <p:nvSpPr>
+          <p:cNvPr id="3" name="Content Placeholder 2">
+            <a:extLst>
+              <a:ext uri="{FF2B5EF4-FFF2-40B4-BE49-F238E27FC236}">
+                <a16:creationId xmlns:a16="http://schemas.microsoft.com/office/drawing/2014/main" id="{26EE99AD-C6EA-973C-5425-EE171E8F74BF}"/>
+              </a:ext>
+            </a:extLst>
+          </p:cNvPr>
+          <p:cNvSpPr>
+            <a:spLocks noGrp="1"/>
+          </p:cNvSpPr>
+          <p:nvPr>
+            <p:ph idx="1"/>
+          </p:nvPr>
+        </p:nvSpPr>
+        <p:spPr/>
+        <p:txBody>
+          <a:bodyPr/>
+          <a:lstStyle/>
+          <a:p>
+            <a:r>
+              <a:rPr lang="en-US" dirty="0"/>
+              <a:t>Deliveroo.js</a:t>
+            </a:r>
+          </a:p>
+          <a:p>
+            <a:r>
+              <a:rPr lang="en-US" dirty="0" err="1"/>
+              <a:t>KnowNo</a:t>
+            </a:r>
+            <a:endParaRPr lang="en-US" dirty="0"/>
+          </a:p>
+          <a:p>
+            <a:r>
+              <a:rPr lang="en-US" dirty="0"/>
+              <a:t>Prompting Strategy</a:t>
+            </a:r>
+          </a:p>
+          <a:p>
+            <a:r>
+              <a:rPr lang="en-US" dirty="0"/>
+              <a:t>Main Model Used</a:t>
+            </a:r>
+          </a:p>
+          <a:p>
+            <a:r>
+              <a:rPr lang="it-IT" dirty="0"/>
+              <a:t>Agent</a:t>
+            </a:r>
+          </a:p>
+        </p:txBody>
+      </p:sp>
+    </p:spTree>
+    <p:extLst>
+      <p:ext uri="{BB962C8B-B14F-4D97-AF65-F5344CB8AC3E}">
+        <p14:creationId xmlns:p14="http://schemas.microsoft.com/office/powerpoint/2010/main" val="1213108665"/>
+      </p:ext>
+    </p:extLst>
+  </p:cSld>
+  <p:clrMapOvr>
+    <a:masterClrMapping/>
+  </p:clrMapOvr>
+</p:sld>
+</file>
+
+<file path=ppt/slides/slide5.xml><?xml version="1.0" encoding="utf-8"?>
+<p:sld xmlns:a="http://schemas.openxmlformats.org/drawingml/2006/main" xmlns:r="http://schemas.openxmlformats.org/officeDocument/2006/relationships" xmlns:p="http://schemas.openxmlformats.org/presentationml/2006/main">
+  <p:cSld>
+    <p:spTree>
+      <p:nvGrpSpPr>
+        <p:cNvPr id="1" name=""/>
+        <p:cNvGrpSpPr/>
+        <p:nvPr/>
+      </p:nvGrpSpPr>
+      <p:grpSpPr>
+        <a:xfrm>
+          <a:off x="0" y="0"/>
+          <a:ext cx="0" cy="0"/>
+          <a:chOff x="0" y="0"/>
+          <a:chExt cx="0" cy="0"/>
+        </a:xfrm>
+      </p:grpSpPr>
+      <p:sp>
+        <p:nvSpPr>
+          <p:cNvPr id="2" name="Title 1">
+            <a:extLst>
+              <a:ext uri="{FF2B5EF4-FFF2-40B4-BE49-F238E27FC236}">
+                <a16:creationId xmlns:a16="http://schemas.microsoft.com/office/drawing/2014/main" id="{A70B027C-0E3D-7E3A-B579-6EBAD4D428B1}"/>
+              </a:ext>
+            </a:extLst>
+          </p:cNvPr>
+          <p:cNvSpPr>
+            <a:spLocks noGrp="1"/>
+          </p:cNvSpPr>
+          <p:nvPr>
+            <p:ph type="title"/>
+          </p:nvPr>
+        </p:nvSpPr>
+        <p:spPr/>
+        <p:txBody>
+          <a:bodyPr/>
+          <a:lstStyle/>
+          <a:p>
+            <a:r>
+              <a:rPr lang="en-US" dirty="0"/>
+              <a:t>Data Collection</a:t>
+            </a:r>
+            <a:endParaRPr lang="it-IT" dirty="0"/>
+          </a:p>
+        </p:txBody>
+      </p:sp>
+      <p:sp>
+        <p:nvSpPr>
+          <p:cNvPr id="3" name="Content Placeholder 2">
+            <a:extLst>
+              <a:ext uri="{FF2B5EF4-FFF2-40B4-BE49-F238E27FC236}">
+                <a16:creationId xmlns:a16="http://schemas.microsoft.com/office/drawing/2014/main" id="{CE840BEE-C797-9B29-E82E-2815C2C438E5}"/>
+              </a:ext>
+            </a:extLst>
+          </p:cNvPr>
+          <p:cNvSpPr>
+            <a:spLocks noGrp="1"/>
+          </p:cNvSpPr>
+          <p:nvPr>
+            <p:ph idx="1"/>
+          </p:nvPr>
+        </p:nvSpPr>
+        <p:spPr/>
+        <p:txBody>
+          <a:bodyPr/>
+          <a:lstStyle/>
+          <a:p>
+            <a:r>
+              <a:rPr lang="en-US" dirty="0"/>
+              <a:t>HM</a:t>
+            </a:r>
+          </a:p>
+          <a:p>
+            <a:r>
+              <a:rPr lang="en-US" dirty="0"/>
+              <a:t>CHM</a:t>
+            </a:r>
+          </a:p>
+          <a:p>
+            <a:pPr marL="0" indent="0">
+              <a:buNone/>
+            </a:pPr>
+            <a:endParaRPr lang="it-IT" dirty="0"/>
+          </a:p>
+        </p:txBody>
+      </p:sp>
+    </p:spTree>
+    <p:extLst>
+      <p:ext uri="{BB962C8B-B14F-4D97-AF65-F5344CB8AC3E}">
+        <p14:creationId xmlns:p14="http://schemas.microsoft.com/office/powerpoint/2010/main" val="1569455533"/>
+      </p:ext>
+    </p:extLst>
+  </p:cSld>
+  <p:clrMapOvr>
+    <a:masterClrMapping/>
+  </p:clrMapOvr>
+</p:sld>
+</file>
+
+<file path=ppt/slides/slide6.xml><?xml version="1.0" encoding="utf-8"?>
+<p:sld xmlns:a="http://schemas.openxmlformats.org/drawingml/2006/main" xmlns:r="http://schemas.openxmlformats.org/officeDocument/2006/relationships" xmlns:p="http://schemas.openxmlformats.org/presentationml/2006/main">
+  <p:cSld>
+    <p:spTree>
+      <p:nvGrpSpPr>
+        <p:cNvPr id="1" name=""/>
+        <p:cNvGrpSpPr/>
+        <p:nvPr/>
+      </p:nvGrpSpPr>
+      <p:grpSpPr>
+        <a:xfrm>
+          <a:off x="0" y="0"/>
+          <a:ext cx="0" cy="0"/>
+          <a:chOff x="0" y="0"/>
+          <a:chExt cx="0" cy="0"/>
+        </a:xfrm>
+      </p:grpSpPr>
+      <p:sp>
+        <p:nvSpPr>
+          <p:cNvPr id="2" name="Title 1">
+            <a:extLst>
+              <a:ext uri="{FF2B5EF4-FFF2-40B4-BE49-F238E27FC236}">
+                <a16:creationId xmlns:a16="http://schemas.microsoft.com/office/drawing/2014/main" id="{E52CDFE9-6C3A-CC7F-9F5C-1B7CB381EE0E}"/>
+              </a:ext>
+            </a:extLst>
+          </p:cNvPr>
+          <p:cNvSpPr>
+            <a:spLocks noGrp="1"/>
+          </p:cNvSpPr>
+          <p:nvPr>
+            <p:ph type="title"/>
+          </p:nvPr>
+        </p:nvSpPr>
+        <p:spPr/>
+        <p:txBody>
+          <a:bodyPr/>
+          <a:lstStyle/>
+          <a:p>
+            <a:r>
+              <a:rPr lang="en-US" dirty="0"/>
+              <a:t>Results</a:t>
+            </a:r>
+            <a:endParaRPr lang="it-IT" dirty="0"/>
+          </a:p>
+        </p:txBody>
+      </p:sp>
+      <p:sp>
+        <p:nvSpPr>
+          <p:cNvPr id="3" name="Content Placeholder 2">
+            <a:extLst>
+              <a:ext uri="{FF2B5EF4-FFF2-40B4-BE49-F238E27FC236}">
+                <a16:creationId xmlns:a16="http://schemas.microsoft.com/office/drawing/2014/main" id="{4360FCE5-293A-2F25-5016-7A7C63D0391E}"/>
+              </a:ext>
+            </a:extLst>
+          </p:cNvPr>
+          <p:cNvSpPr>
+            <a:spLocks noGrp="1"/>
+          </p:cNvSpPr>
+          <p:nvPr>
+            <p:ph idx="1"/>
+          </p:nvPr>
+        </p:nvSpPr>
+        <p:spPr/>
+        <p:txBody>
+          <a:bodyPr/>
+          <a:lstStyle/>
+          <a:p>
+            <a:r>
+              <a:rPr lang="en-US" dirty="0"/>
+              <a:t>Origin bias</a:t>
+            </a:r>
+          </a:p>
+          <a:p>
+            <a:r>
+              <a:rPr lang="en-US" dirty="0"/>
+              <a:t>Uncertainty trends</a:t>
+            </a:r>
+          </a:p>
+          <a:p>
+            <a:r>
+              <a:rPr lang="en-US" dirty="0"/>
+              <a:t>Implicit vs Explicit Goals</a:t>
+            </a:r>
+          </a:p>
+          <a:p>
+            <a:r>
+              <a:rPr lang="en-US" dirty="0"/>
+              <a:t>Slice as Quadrants</a:t>
+            </a:r>
+          </a:p>
+          <a:p>
+            <a:r>
+              <a:rPr lang="en-US" dirty="0"/>
+              <a:t>Central slices similar behavior</a:t>
+            </a:r>
+          </a:p>
+          <a:p>
+            <a:r>
+              <a:rPr lang="en-US" dirty="0"/>
+              <a:t>Extra (Path Finding + Closest Cell)</a:t>
+            </a:r>
+          </a:p>
+          <a:p>
+            <a:endParaRPr lang="it-IT" dirty="0"/>
+          </a:p>
+        </p:txBody>
+      </p:sp>
+    </p:spTree>
+    <p:extLst>
+      <p:ext uri="{BB962C8B-B14F-4D97-AF65-F5344CB8AC3E}">
+        <p14:creationId xmlns:p14="http://schemas.microsoft.com/office/powerpoint/2010/main" val="799171912"/>
+      </p:ext>
+    </p:extLst>
+  </p:cSld>
+  <p:clrMapOvr>
+    <a:masterClrMapping/>
+  </p:clrMapOvr>
+</p:sld>
+</file>
+
+<file path=ppt/slides/slide7.xml><?xml version="1.0" encoding="utf-8"?>
+<p:sld xmlns:a="http://schemas.openxmlformats.org/drawingml/2006/main" xmlns:r="http://schemas.openxmlformats.org/officeDocument/2006/relationships" xmlns:p="http://schemas.openxmlformats.org/presentationml/2006/main">
+  <p:cSld>
+    <p:spTree>
+      <p:nvGrpSpPr>
+        <p:cNvPr id="1" name=""/>
+        <p:cNvGrpSpPr/>
+        <p:nvPr/>
+      </p:nvGrpSpPr>
+      <p:grpSpPr>
+        <a:xfrm>
+          <a:off x="0" y="0"/>
+          <a:ext cx="0" cy="0"/>
+          <a:chOff x="0" y="0"/>
+          <a:chExt cx="0" cy="0"/>
+        </a:xfrm>
+      </p:grpSpPr>
+      <p:sp>
+        <p:nvSpPr>
+          <p:cNvPr id="2" name="Title 1">
+            <a:extLst>
+              <a:ext uri="{FF2B5EF4-FFF2-40B4-BE49-F238E27FC236}">
+                <a16:creationId xmlns:a16="http://schemas.microsoft.com/office/drawing/2014/main" id="{4FC81D3B-F4BB-7F54-E018-9330964E806F}"/>
+              </a:ext>
+            </a:extLst>
+          </p:cNvPr>
+          <p:cNvSpPr>
+            <a:spLocks noGrp="1"/>
+          </p:cNvSpPr>
+          <p:nvPr>
+            <p:ph type="title"/>
+          </p:nvPr>
+        </p:nvSpPr>
+        <p:spPr/>
+        <p:txBody>
+          <a:bodyPr/>
+          <a:lstStyle/>
+          <a:p>
+            <a:r>
+              <a:rPr lang="en-US" dirty="0"/>
+              <a:t>S&amp;W</a:t>
+            </a:r>
+            <a:endParaRPr lang="it-IT" dirty="0"/>
+          </a:p>
+        </p:txBody>
+      </p:sp>
+      <p:sp>
+        <p:nvSpPr>
+          <p:cNvPr id="3" name="Content Placeholder 2">
+            <a:extLst>
+              <a:ext uri="{FF2B5EF4-FFF2-40B4-BE49-F238E27FC236}">
+                <a16:creationId xmlns:a16="http://schemas.microsoft.com/office/drawing/2014/main" id="{47ED2F34-C65E-E973-C81C-32D0280499BC}"/>
+              </a:ext>
+            </a:extLst>
+          </p:cNvPr>
+          <p:cNvSpPr>
+            <a:spLocks noGrp="1"/>
+          </p:cNvSpPr>
+          <p:nvPr>
+            <p:ph idx="1"/>
+          </p:nvPr>
+        </p:nvSpPr>
+        <p:spPr>
+          <a:xfrm>
+            <a:off x="6248400" y="1978025"/>
+            <a:ext cx="5257800" cy="4351338"/>
+          </a:xfrm>
+        </p:spPr>
+        <p:txBody>
+          <a:bodyPr/>
+          <a:lstStyle/>
+          <a:p>
+            <a:r>
+              <a:rPr lang="en-US" dirty="0" err="1"/>
+              <a:t>aaa</a:t>
+            </a:r>
+            <a:endParaRPr lang="it-IT" dirty="0"/>
+          </a:p>
+        </p:txBody>
+      </p:sp>
+      <p:sp>
+        <p:nvSpPr>
+          <p:cNvPr id="4" name="Content Placeholder 2">
+            <a:extLst>
+              <a:ext uri="{FF2B5EF4-FFF2-40B4-BE49-F238E27FC236}">
+                <a16:creationId xmlns:a16="http://schemas.microsoft.com/office/drawing/2014/main" id="{B2A3FB24-3E35-5D0F-0E99-2FA4B6B92A0C}"/>
+              </a:ext>
+            </a:extLst>
+          </p:cNvPr>
+          <p:cNvSpPr txBox="1">
+            <a:spLocks/>
+          </p:cNvSpPr>
+          <p:nvPr/>
+        </p:nvSpPr>
+        <p:spPr>
+          <a:xfrm>
+            <a:off x="990600" y="1978025"/>
+            <a:ext cx="5257800" cy="4351338"/>
+          </a:xfrm>
+          <a:prstGeom prst="rect">
+            <a:avLst/>
+          </a:prstGeom>
+        </p:spPr>
+        <p:txBody>
+          <a:bodyPr vert="horz" lIns="91440" tIns="45720" rIns="91440" bIns="45720" rtlCol="0">
+            <a:normAutofit/>
+          </a:bodyPr>
+          <a:lstStyle>
+            <a:lvl1pPr marL="228600" indent="-228600" algn="l" defTabSz="914400" rtl="0" eaLnBrk="1" latinLnBrk="0" hangingPunct="1">
+              <a:lnSpc>
+                <a:spcPct val="90000"/>
+              </a:lnSpc>
+              <a:spcBef>
+                <a:spcPts val="1000"/>
+              </a:spcBef>
+              <a:buFont typeface="Arial" panose="020B0604020202020204" pitchFamily="34" charset="0"/>
+              <a:buChar char="•"/>
+              <a:defRPr sz="2800" kern="1200">
+                <a:solidFill>
+                  <a:schemeClr val="tx1"/>
+                </a:solidFill>
+                <a:latin typeface="+mn-lt"/>
+                <a:ea typeface="+mn-ea"/>
+                <a:cs typeface="+mn-cs"/>
+              </a:defRPr>
+            </a:lvl1pPr>
+            <a:lvl2pPr marL="685800" indent="-228600" algn="l" defTabSz="914400" rtl="0" eaLnBrk="1" latinLnBrk="0" hangingPunct="1">
+              <a:lnSpc>
+                <a:spcPct val="90000"/>
+              </a:lnSpc>
+              <a:spcBef>
+                <a:spcPts val="500"/>
+              </a:spcBef>
+              <a:buFont typeface="Arial" panose="020B0604020202020204" pitchFamily="34" charset="0"/>
+              <a:buChar char="•"/>
+              <a:defRPr sz="2400" kern="1200">
+                <a:solidFill>
+                  <a:schemeClr val="tx1"/>
+                </a:solidFill>
+                <a:latin typeface="+mn-lt"/>
+                <a:ea typeface="+mn-ea"/>
+                <a:cs typeface="+mn-cs"/>
+              </a:defRPr>
+            </a:lvl2pPr>
+            <a:lvl3pPr marL="1143000" indent="-228600" algn="l" defTabSz="914400" rtl="0" eaLnBrk="1" latinLnBrk="0" hangingPunct="1">
+              <a:lnSpc>
+                <a:spcPct val="90000"/>
+              </a:lnSpc>
+              <a:spcBef>
+                <a:spcPts val="500"/>
+              </a:spcBef>
+              <a:buFont typeface="Arial" panose="020B0604020202020204" pitchFamily="34" charset="0"/>
+              <a:buChar char="•"/>
+              <a:defRPr sz="2000" kern="1200">
+                <a:solidFill>
+                  <a:schemeClr val="tx1"/>
+                </a:solidFill>
+                <a:latin typeface="+mn-lt"/>
+                <a:ea typeface="+mn-ea"/>
+                <a:cs typeface="+mn-cs"/>
+              </a:defRPr>
+            </a:lvl3pPr>
+            <a:lvl4pPr marL="1600200" indent="-228600" algn="l" defTabSz="914400" rtl="0" eaLnBrk="1" latinLnBrk="0" hangingPunct="1">
+              <a:lnSpc>
+                <a:spcPct val="90000"/>
+              </a:lnSpc>
+              <a:spcBef>
+                <a:spcPts val="500"/>
+              </a:spcBef>
+              <a:buFont typeface="Arial" panose="020B0604020202020204" pitchFamily="34" charset="0"/>
+              <a:buChar char="•"/>
+              <a:defRPr sz="1800" kern="1200">
+                <a:solidFill>
+                  <a:schemeClr val="tx1"/>
+                </a:solidFill>
+                <a:latin typeface="+mn-lt"/>
+                <a:ea typeface="+mn-ea"/>
+                <a:cs typeface="+mn-cs"/>
+              </a:defRPr>
+            </a:lvl4pPr>
+            <a:lvl5pPr marL="2057400" indent="-228600" algn="l" defTabSz="914400" rtl="0" eaLnBrk="1" latinLnBrk="0" hangingPunct="1">
+              <a:lnSpc>
+                <a:spcPct val="90000"/>
+              </a:lnSpc>
+              <a:spcBef>
+                <a:spcPts val="500"/>
+              </a:spcBef>
+              <a:buFont typeface="Arial" panose="020B0604020202020204" pitchFamily="34" charset="0"/>
+              <a:buChar char="•"/>
+              <a:defRPr sz="1800" kern="1200">
+                <a:solidFill>
+                  <a:schemeClr val="tx1"/>
+                </a:solidFill>
+                <a:latin typeface="+mn-lt"/>
+                <a:ea typeface="+mn-ea"/>
+                <a:cs typeface="+mn-cs"/>
+              </a:defRPr>
+            </a:lvl5pPr>
+            <a:lvl6pPr marL="2514600" indent="-228600" algn="l" defTabSz="914400" rtl="0" eaLnBrk="1" latinLnBrk="0" hangingPunct="1">
+              <a:lnSpc>
+                <a:spcPct val="90000"/>
+              </a:lnSpc>
+              <a:spcBef>
+                <a:spcPts val="500"/>
+              </a:spcBef>
+              <a:buFont typeface="Arial" panose="020B0604020202020204" pitchFamily="34" charset="0"/>
+              <a:buChar char="•"/>
+              <a:defRPr sz="1800" kern="1200">
+                <a:solidFill>
+                  <a:schemeClr val="tx1"/>
+                </a:solidFill>
+                <a:latin typeface="+mn-lt"/>
+                <a:ea typeface="+mn-ea"/>
+                <a:cs typeface="+mn-cs"/>
+              </a:defRPr>
+            </a:lvl6pPr>
+            <a:lvl7pPr marL="2971800" indent="-228600" algn="l" defTabSz="914400" rtl="0" eaLnBrk="1" latinLnBrk="0" hangingPunct="1">
+              <a:lnSpc>
+                <a:spcPct val="90000"/>
+              </a:lnSpc>
+              <a:spcBef>
+                <a:spcPts val="500"/>
+              </a:spcBef>
+              <a:buFont typeface="Arial" panose="020B0604020202020204" pitchFamily="34" charset="0"/>
+              <a:buChar char="•"/>
+              <a:defRPr sz="1800" kern="1200">
+                <a:solidFill>
+                  <a:schemeClr val="tx1"/>
+                </a:solidFill>
+                <a:latin typeface="+mn-lt"/>
+                <a:ea typeface="+mn-ea"/>
+                <a:cs typeface="+mn-cs"/>
+              </a:defRPr>
+            </a:lvl7pPr>
+            <a:lvl8pPr marL="3429000" indent="-228600" algn="l" defTabSz="914400" rtl="0" eaLnBrk="1" latinLnBrk="0" hangingPunct="1">
+              <a:lnSpc>
+                <a:spcPct val="90000"/>
+              </a:lnSpc>
+              <a:spcBef>
+                <a:spcPts val="500"/>
+              </a:spcBef>
+              <a:buFont typeface="Arial" panose="020B0604020202020204" pitchFamily="34" charset="0"/>
+              <a:buChar char="•"/>
+              <a:defRPr sz="1800" kern="1200">
+                <a:solidFill>
+                  <a:schemeClr val="tx1"/>
+                </a:solidFill>
+                <a:latin typeface="+mn-lt"/>
+                <a:ea typeface="+mn-ea"/>
+                <a:cs typeface="+mn-cs"/>
+              </a:defRPr>
+            </a:lvl8pPr>
+            <a:lvl9pPr marL="3886200" indent="-228600" algn="l" defTabSz="914400" rtl="0" eaLnBrk="1" latinLnBrk="0" hangingPunct="1">
+              <a:lnSpc>
+                <a:spcPct val="90000"/>
+              </a:lnSpc>
+              <a:spcBef>
+                <a:spcPts val="500"/>
+              </a:spcBef>
+              <a:buFont typeface="Arial" panose="020B0604020202020204" pitchFamily="34" charset="0"/>
+              <a:buChar char="•"/>
+              <a:defRPr sz="1800" kern="1200">
+                <a:solidFill>
+                  <a:schemeClr val="tx1"/>
+                </a:solidFill>
+                <a:latin typeface="+mn-lt"/>
+                <a:ea typeface="+mn-ea"/>
+                <a:cs typeface="+mn-cs"/>
+              </a:defRPr>
+            </a:lvl9pPr>
+          </a:lstStyle>
+          <a:p>
+            <a:r>
+              <a:rPr lang="en-US" dirty="0" err="1"/>
+              <a:t>aaa</a:t>
+            </a:r>
+            <a:endParaRPr lang="it-IT" dirty="0"/>
+          </a:p>
+        </p:txBody>
+      </p:sp>
+    </p:spTree>
+    <p:extLst>
+      <p:ext uri="{BB962C8B-B14F-4D97-AF65-F5344CB8AC3E}">
+        <p14:creationId xmlns:p14="http://schemas.microsoft.com/office/powerpoint/2010/main" val="3862191006"/>
       </p:ext>
     </p:extLst>
   </p:cSld>

</xml_diff>

<commit_message>
update presentation and speech
</commit_message>
<xml_diff>
--- a/presentation/Exploring the Use of LLMs for Agent Planning.pptx
+++ b/presentation/Exploring the Use of LLMs for Agent Planning.pptx
@@ -4,14 +4,18 @@
   <p:sldMasterIdLst>
     <p:sldMasterId id="2147483737" r:id="rId1"/>
   </p:sldMasterIdLst>
+  <p:notesMasterIdLst>
+    <p:notesMasterId r:id="rId10"/>
+  </p:notesMasterIdLst>
   <p:sldIdLst>
-    <p:sldId id="256" r:id="rId2"/>
-    <p:sldId id="257" r:id="rId3"/>
-    <p:sldId id="258" r:id="rId4"/>
-    <p:sldId id="259" r:id="rId5"/>
-    <p:sldId id="260" r:id="rId6"/>
-    <p:sldId id="261" r:id="rId7"/>
-    <p:sldId id="262" r:id="rId8"/>
+    <p:sldId id="263" r:id="rId2"/>
+    <p:sldId id="264" r:id="rId3"/>
+    <p:sldId id="257" r:id="rId4"/>
+    <p:sldId id="258" r:id="rId5"/>
+    <p:sldId id="259" r:id="rId6"/>
+    <p:sldId id="260" r:id="rId7"/>
+    <p:sldId id="261" r:id="rId8"/>
+    <p:sldId id="262" r:id="rId9"/>
   </p:sldIdLst>
   <p:sldSz cx="12192000" cy="6858000"/>
   <p:notesSz cx="6858000" cy="9144000"/>
@@ -118,6 +122,632 @@
 </p:presentation>
 </file>
 
+<file path=ppt/notesMasters/notesMaster1.xml><?xml version="1.0" encoding="utf-8"?>
+<p:notesMaster xmlns:a="http://schemas.openxmlformats.org/drawingml/2006/main" xmlns:r="http://schemas.openxmlformats.org/officeDocument/2006/relationships" xmlns:p="http://schemas.openxmlformats.org/presentationml/2006/main">
+  <p:cSld>
+    <p:bg>
+      <p:bgRef idx="1001">
+        <a:schemeClr val="bg1"/>
+      </p:bgRef>
+    </p:bg>
+    <p:spTree>
+      <p:nvGrpSpPr>
+        <p:cNvPr id="1" name=""/>
+        <p:cNvGrpSpPr/>
+        <p:nvPr/>
+      </p:nvGrpSpPr>
+      <p:grpSpPr>
+        <a:xfrm>
+          <a:off x="0" y="0"/>
+          <a:ext cx="0" cy="0"/>
+          <a:chOff x="0" y="0"/>
+          <a:chExt cx="0" cy="0"/>
+        </a:xfrm>
+      </p:grpSpPr>
+      <p:sp>
+        <p:nvSpPr>
+          <p:cNvPr id="2" name="Header Placeholder 1"/>
+          <p:cNvSpPr>
+            <a:spLocks noGrp="1"/>
+          </p:cNvSpPr>
+          <p:nvPr>
+            <p:ph type="hdr" sz="quarter"/>
+          </p:nvPr>
+        </p:nvSpPr>
+        <p:spPr>
+          <a:xfrm>
+            <a:off x="0" y="0"/>
+            <a:ext cx="2971800" cy="458788"/>
+          </a:xfrm>
+          <a:prstGeom prst="rect">
+            <a:avLst/>
+          </a:prstGeom>
+        </p:spPr>
+        <p:txBody>
+          <a:bodyPr vert="horz" lIns="91440" tIns="45720" rIns="91440" bIns="45720" rtlCol="0"/>
+          <a:lstStyle>
+            <a:lvl1pPr algn="l">
+              <a:defRPr sz="1200"/>
+            </a:lvl1pPr>
+          </a:lstStyle>
+          <a:p>
+            <a:endParaRPr lang="it-IT"/>
+          </a:p>
+        </p:txBody>
+      </p:sp>
+      <p:sp>
+        <p:nvSpPr>
+          <p:cNvPr id="3" name="Date Placeholder 2"/>
+          <p:cNvSpPr>
+            <a:spLocks noGrp="1"/>
+          </p:cNvSpPr>
+          <p:nvPr>
+            <p:ph type="dt" idx="1"/>
+          </p:nvPr>
+        </p:nvSpPr>
+        <p:spPr>
+          <a:xfrm>
+            <a:off x="3884613" y="0"/>
+            <a:ext cx="2971800" cy="458788"/>
+          </a:xfrm>
+          <a:prstGeom prst="rect">
+            <a:avLst/>
+          </a:prstGeom>
+        </p:spPr>
+        <p:txBody>
+          <a:bodyPr vert="horz" lIns="91440" tIns="45720" rIns="91440" bIns="45720" rtlCol="0"/>
+          <a:lstStyle>
+            <a:lvl1pPr algn="r">
+              <a:defRPr sz="1200"/>
+            </a:lvl1pPr>
+          </a:lstStyle>
+          <a:p>
+            <a:fld id="{6C8E7BE6-83AF-4BD5-9352-AED1E6EADA43}" type="datetimeFigureOut">
+              <a:rPr lang="it-IT" smtClean="0"/>
+              <a:t>11/03/2025</a:t>
+            </a:fld>
+            <a:endParaRPr lang="it-IT"/>
+          </a:p>
+        </p:txBody>
+      </p:sp>
+      <p:sp>
+        <p:nvSpPr>
+          <p:cNvPr id="4" name="Slide Image Placeholder 3"/>
+          <p:cNvSpPr>
+            <a:spLocks noGrp="1" noRot="1" noChangeAspect="1"/>
+          </p:cNvSpPr>
+          <p:nvPr>
+            <p:ph type="sldImg" idx="2"/>
+          </p:nvPr>
+        </p:nvSpPr>
+        <p:spPr>
+          <a:xfrm>
+            <a:off x="685800" y="1143000"/>
+            <a:ext cx="5486400" cy="3086100"/>
+          </a:xfrm>
+          <a:prstGeom prst="rect">
+            <a:avLst/>
+          </a:prstGeom>
+          <a:noFill/>
+          <a:ln w="12700">
+            <a:solidFill>
+              <a:prstClr val="black"/>
+            </a:solidFill>
+          </a:ln>
+        </p:spPr>
+        <p:txBody>
+          <a:bodyPr vert="horz" lIns="91440" tIns="45720" rIns="91440" bIns="45720" rtlCol="0" anchor="ctr"/>
+          <a:lstStyle/>
+          <a:p>
+            <a:endParaRPr lang="it-IT"/>
+          </a:p>
+        </p:txBody>
+      </p:sp>
+      <p:sp>
+        <p:nvSpPr>
+          <p:cNvPr id="5" name="Notes Placeholder 4"/>
+          <p:cNvSpPr>
+            <a:spLocks noGrp="1"/>
+          </p:cNvSpPr>
+          <p:nvPr>
+            <p:ph type="body" sz="quarter" idx="3"/>
+          </p:nvPr>
+        </p:nvSpPr>
+        <p:spPr>
+          <a:xfrm>
+            <a:off x="685800" y="4400550"/>
+            <a:ext cx="5486400" cy="3600450"/>
+          </a:xfrm>
+          <a:prstGeom prst="rect">
+            <a:avLst/>
+          </a:prstGeom>
+        </p:spPr>
+        <p:txBody>
+          <a:bodyPr vert="horz" lIns="91440" tIns="45720" rIns="91440" bIns="45720" rtlCol="0"/>
+          <a:lstStyle/>
+          <a:p>
+            <a:pPr lvl="0"/>
+            <a:r>
+              <a:rPr lang="en-US"/>
+              <a:t>Click to edit Master text styles</a:t>
+            </a:r>
+          </a:p>
+          <a:p>
+            <a:pPr lvl="1"/>
+            <a:r>
+              <a:rPr lang="en-US"/>
+              <a:t>Second level</a:t>
+            </a:r>
+          </a:p>
+          <a:p>
+            <a:pPr lvl="2"/>
+            <a:r>
+              <a:rPr lang="en-US"/>
+              <a:t>Third level</a:t>
+            </a:r>
+          </a:p>
+          <a:p>
+            <a:pPr lvl="3"/>
+            <a:r>
+              <a:rPr lang="en-US"/>
+              <a:t>Fourth level</a:t>
+            </a:r>
+          </a:p>
+          <a:p>
+            <a:pPr lvl="4"/>
+            <a:r>
+              <a:rPr lang="en-US"/>
+              <a:t>Fifth level</a:t>
+            </a:r>
+            <a:endParaRPr lang="it-IT"/>
+          </a:p>
+        </p:txBody>
+      </p:sp>
+      <p:sp>
+        <p:nvSpPr>
+          <p:cNvPr id="6" name="Footer Placeholder 5"/>
+          <p:cNvSpPr>
+            <a:spLocks noGrp="1"/>
+          </p:cNvSpPr>
+          <p:nvPr>
+            <p:ph type="ftr" sz="quarter" idx="4"/>
+          </p:nvPr>
+        </p:nvSpPr>
+        <p:spPr>
+          <a:xfrm>
+            <a:off x="0" y="8685213"/>
+            <a:ext cx="2971800" cy="458787"/>
+          </a:xfrm>
+          <a:prstGeom prst="rect">
+            <a:avLst/>
+          </a:prstGeom>
+        </p:spPr>
+        <p:txBody>
+          <a:bodyPr vert="horz" lIns="91440" tIns="45720" rIns="91440" bIns="45720" rtlCol="0" anchor="b"/>
+          <a:lstStyle>
+            <a:lvl1pPr algn="l">
+              <a:defRPr sz="1200"/>
+            </a:lvl1pPr>
+          </a:lstStyle>
+          <a:p>
+            <a:endParaRPr lang="it-IT"/>
+          </a:p>
+        </p:txBody>
+      </p:sp>
+      <p:sp>
+        <p:nvSpPr>
+          <p:cNvPr id="7" name="Slide Number Placeholder 6"/>
+          <p:cNvSpPr>
+            <a:spLocks noGrp="1"/>
+          </p:cNvSpPr>
+          <p:nvPr>
+            <p:ph type="sldNum" sz="quarter" idx="5"/>
+          </p:nvPr>
+        </p:nvSpPr>
+        <p:spPr>
+          <a:xfrm>
+            <a:off x="3884613" y="8685213"/>
+            <a:ext cx="2971800" cy="458787"/>
+          </a:xfrm>
+          <a:prstGeom prst="rect">
+            <a:avLst/>
+          </a:prstGeom>
+        </p:spPr>
+        <p:txBody>
+          <a:bodyPr vert="horz" lIns="91440" tIns="45720" rIns="91440" bIns="45720" rtlCol="0" anchor="b"/>
+          <a:lstStyle>
+            <a:lvl1pPr algn="r">
+              <a:defRPr sz="1200"/>
+            </a:lvl1pPr>
+          </a:lstStyle>
+          <a:p>
+            <a:fld id="{55A7B57A-AE85-4914-AC75-AD1AB437EDC3}" type="slidenum">
+              <a:rPr lang="it-IT" smtClean="0"/>
+              <a:t>‹#›</a:t>
+            </a:fld>
+            <a:endParaRPr lang="it-IT"/>
+          </a:p>
+        </p:txBody>
+      </p:sp>
+    </p:spTree>
+    <p:extLst>
+      <p:ext uri="{BB962C8B-B14F-4D97-AF65-F5344CB8AC3E}">
+        <p14:creationId xmlns:p14="http://schemas.microsoft.com/office/powerpoint/2010/main" val="3658275924"/>
+      </p:ext>
+    </p:extLst>
+  </p:cSld>
+  <p:clrMap bg1="lt1" tx1="dk1" bg2="lt2" tx2="dk2" accent1="accent1" accent2="accent2" accent3="accent3" accent4="accent4" accent5="accent5" accent6="accent6" hlink="hlink" folHlink="folHlink"/>
+  <p:notesStyle>
+    <a:lvl1pPr marL="0" algn="l" defTabSz="914400" rtl="0" eaLnBrk="1" latinLnBrk="0" hangingPunct="1">
+      <a:defRPr sz="1200" kern="1200">
+        <a:solidFill>
+          <a:schemeClr val="tx1"/>
+        </a:solidFill>
+        <a:latin typeface="+mn-lt"/>
+        <a:ea typeface="+mn-ea"/>
+        <a:cs typeface="+mn-cs"/>
+      </a:defRPr>
+    </a:lvl1pPr>
+    <a:lvl2pPr marL="457200" algn="l" defTabSz="914400" rtl="0" eaLnBrk="1" latinLnBrk="0" hangingPunct="1">
+      <a:defRPr sz="1200" kern="1200">
+        <a:solidFill>
+          <a:schemeClr val="tx1"/>
+        </a:solidFill>
+        <a:latin typeface="+mn-lt"/>
+        <a:ea typeface="+mn-ea"/>
+        <a:cs typeface="+mn-cs"/>
+      </a:defRPr>
+    </a:lvl2pPr>
+    <a:lvl3pPr marL="914400" algn="l" defTabSz="914400" rtl="0" eaLnBrk="1" latinLnBrk="0" hangingPunct="1">
+      <a:defRPr sz="1200" kern="1200">
+        <a:solidFill>
+          <a:schemeClr val="tx1"/>
+        </a:solidFill>
+        <a:latin typeface="+mn-lt"/>
+        <a:ea typeface="+mn-ea"/>
+        <a:cs typeface="+mn-cs"/>
+      </a:defRPr>
+    </a:lvl3pPr>
+    <a:lvl4pPr marL="1371600" algn="l" defTabSz="914400" rtl="0" eaLnBrk="1" latinLnBrk="0" hangingPunct="1">
+      <a:defRPr sz="1200" kern="1200">
+        <a:solidFill>
+          <a:schemeClr val="tx1"/>
+        </a:solidFill>
+        <a:latin typeface="+mn-lt"/>
+        <a:ea typeface="+mn-ea"/>
+        <a:cs typeface="+mn-cs"/>
+      </a:defRPr>
+    </a:lvl4pPr>
+    <a:lvl5pPr marL="1828800" algn="l" defTabSz="914400" rtl="0" eaLnBrk="1" latinLnBrk="0" hangingPunct="1">
+      <a:defRPr sz="1200" kern="1200">
+        <a:solidFill>
+          <a:schemeClr val="tx1"/>
+        </a:solidFill>
+        <a:latin typeface="+mn-lt"/>
+        <a:ea typeface="+mn-ea"/>
+        <a:cs typeface="+mn-cs"/>
+      </a:defRPr>
+    </a:lvl5pPr>
+    <a:lvl6pPr marL="2286000" algn="l" defTabSz="914400" rtl="0" eaLnBrk="1" latinLnBrk="0" hangingPunct="1">
+      <a:defRPr sz="1200" kern="1200">
+        <a:solidFill>
+          <a:schemeClr val="tx1"/>
+        </a:solidFill>
+        <a:latin typeface="+mn-lt"/>
+        <a:ea typeface="+mn-ea"/>
+        <a:cs typeface="+mn-cs"/>
+      </a:defRPr>
+    </a:lvl6pPr>
+    <a:lvl7pPr marL="2743200" algn="l" defTabSz="914400" rtl="0" eaLnBrk="1" latinLnBrk="0" hangingPunct="1">
+      <a:defRPr sz="1200" kern="1200">
+        <a:solidFill>
+          <a:schemeClr val="tx1"/>
+        </a:solidFill>
+        <a:latin typeface="+mn-lt"/>
+        <a:ea typeface="+mn-ea"/>
+        <a:cs typeface="+mn-cs"/>
+      </a:defRPr>
+    </a:lvl7pPr>
+    <a:lvl8pPr marL="3200400" algn="l" defTabSz="914400" rtl="0" eaLnBrk="1" latinLnBrk="0" hangingPunct="1">
+      <a:defRPr sz="1200" kern="1200">
+        <a:solidFill>
+          <a:schemeClr val="tx1"/>
+        </a:solidFill>
+        <a:latin typeface="+mn-lt"/>
+        <a:ea typeface="+mn-ea"/>
+        <a:cs typeface="+mn-cs"/>
+      </a:defRPr>
+    </a:lvl8pPr>
+    <a:lvl9pPr marL="3657600" algn="l" defTabSz="914400" rtl="0" eaLnBrk="1" latinLnBrk="0" hangingPunct="1">
+      <a:defRPr sz="1200" kern="1200">
+        <a:solidFill>
+          <a:schemeClr val="tx1"/>
+        </a:solidFill>
+        <a:latin typeface="+mn-lt"/>
+        <a:ea typeface="+mn-ea"/>
+        <a:cs typeface="+mn-cs"/>
+      </a:defRPr>
+    </a:lvl9pPr>
+  </p:notesStyle>
+</p:notesMaster>
+</file>
+
+<file path=ppt/notesSlides/notesSlide1.xml><?xml version="1.0" encoding="utf-8"?>
+<p:notes xmlns:a="http://schemas.openxmlformats.org/drawingml/2006/main" xmlns:r="http://schemas.openxmlformats.org/officeDocument/2006/relationships" xmlns:p="http://schemas.openxmlformats.org/presentationml/2006/main">
+  <p:cSld>
+    <p:spTree>
+      <p:nvGrpSpPr>
+        <p:cNvPr id="1" name=""/>
+        <p:cNvGrpSpPr/>
+        <p:nvPr/>
+      </p:nvGrpSpPr>
+      <p:grpSpPr>
+        <a:xfrm>
+          <a:off x="0" y="0"/>
+          <a:ext cx="0" cy="0"/>
+          <a:chOff x="0" y="0"/>
+          <a:chExt cx="0" cy="0"/>
+        </a:xfrm>
+      </p:grpSpPr>
+      <p:sp>
+        <p:nvSpPr>
+          <p:cNvPr id="2" name="Slide Image Placeholder 1"/>
+          <p:cNvSpPr>
+            <a:spLocks noGrp="1" noRot="1" noChangeAspect="1"/>
+          </p:cNvSpPr>
+          <p:nvPr>
+            <p:ph type="sldImg"/>
+          </p:nvPr>
+        </p:nvSpPr>
+        <p:spPr/>
+      </p:sp>
+      <p:sp>
+        <p:nvSpPr>
+          <p:cNvPr id="3" name="Notes Placeholder 2"/>
+          <p:cNvSpPr>
+            <a:spLocks noGrp="1"/>
+          </p:cNvSpPr>
+          <p:nvPr>
+            <p:ph type="body" idx="1"/>
+          </p:nvPr>
+        </p:nvSpPr>
+        <p:spPr/>
+        <p:txBody>
+          <a:bodyPr/>
+          <a:lstStyle/>
+          <a:p>
+            <a:endParaRPr lang="it-IT" dirty="0"/>
+          </a:p>
+        </p:txBody>
+      </p:sp>
+      <p:sp>
+        <p:nvSpPr>
+          <p:cNvPr id="4" name="Slide Number Placeholder 3"/>
+          <p:cNvSpPr>
+            <a:spLocks noGrp="1"/>
+          </p:cNvSpPr>
+          <p:nvPr>
+            <p:ph type="sldNum" sz="quarter" idx="5"/>
+          </p:nvPr>
+        </p:nvSpPr>
+        <p:spPr/>
+        <p:txBody>
+          <a:bodyPr/>
+          <a:lstStyle/>
+          <a:p>
+            <a:fld id="{55A7B57A-AE85-4914-AC75-AD1AB437EDC3}" type="slidenum">
+              <a:rPr lang="it-IT" smtClean="0"/>
+              <a:t>1</a:t>
+            </a:fld>
+            <a:endParaRPr lang="it-IT"/>
+          </a:p>
+        </p:txBody>
+      </p:sp>
+    </p:spTree>
+    <p:extLst>
+      <p:ext uri="{BB962C8B-B14F-4D97-AF65-F5344CB8AC3E}">
+        <p14:creationId xmlns:p14="http://schemas.microsoft.com/office/powerpoint/2010/main" val="1431837278"/>
+      </p:ext>
+    </p:extLst>
+  </p:cSld>
+  <p:clrMapOvr>
+    <a:masterClrMapping/>
+  </p:clrMapOvr>
+</p:notes>
+</file>
+
+<file path=ppt/notesSlides/notesSlide2.xml><?xml version="1.0" encoding="utf-8"?>
+<p:notes xmlns:a="http://schemas.openxmlformats.org/drawingml/2006/main" xmlns:r="http://schemas.openxmlformats.org/officeDocument/2006/relationships" xmlns:p="http://schemas.openxmlformats.org/presentationml/2006/main">
+  <p:cSld>
+    <p:spTree>
+      <p:nvGrpSpPr>
+        <p:cNvPr id="1" name="">
+          <a:extLst>
+            <a:ext uri="{FF2B5EF4-FFF2-40B4-BE49-F238E27FC236}">
+              <a16:creationId xmlns:a16="http://schemas.microsoft.com/office/drawing/2014/main" id="{ADBFACC6-3820-085F-7BA0-EE2336A8554A}"/>
+            </a:ext>
+          </a:extLst>
+        </p:cNvPr>
+        <p:cNvGrpSpPr/>
+        <p:nvPr/>
+      </p:nvGrpSpPr>
+      <p:grpSpPr>
+        <a:xfrm>
+          <a:off x="0" y="0"/>
+          <a:ext cx="0" cy="0"/>
+          <a:chOff x="0" y="0"/>
+          <a:chExt cx="0" cy="0"/>
+        </a:xfrm>
+      </p:grpSpPr>
+      <p:sp>
+        <p:nvSpPr>
+          <p:cNvPr id="2" name="Slide Image Placeholder 1">
+            <a:extLst>
+              <a:ext uri="{FF2B5EF4-FFF2-40B4-BE49-F238E27FC236}">
+                <a16:creationId xmlns:a16="http://schemas.microsoft.com/office/drawing/2014/main" id="{9CB8011B-20D0-2970-8986-ED1AA6E9D244}"/>
+              </a:ext>
+            </a:extLst>
+          </p:cNvPr>
+          <p:cNvSpPr>
+            <a:spLocks noGrp="1" noRot="1" noChangeAspect="1"/>
+          </p:cNvSpPr>
+          <p:nvPr>
+            <p:ph type="sldImg"/>
+          </p:nvPr>
+        </p:nvSpPr>
+        <p:spPr/>
+      </p:sp>
+      <p:sp>
+        <p:nvSpPr>
+          <p:cNvPr id="3" name="Notes Placeholder 2">
+            <a:extLst>
+              <a:ext uri="{FF2B5EF4-FFF2-40B4-BE49-F238E27FC236}">
+                <a16:creationId xmlns:a16="http://schemas.microsoft.com/office/drawing/2014/main" id="{2988C190-762A-9EBD-3BFD-60006C33CD0B}"/>
+              </a:ext>
+            </a:extLst>
+          </p:cNvPr>
+          <p:cNvSpPr>
+            <a:spLocks noGrp="1"/>
+          </p:cNvSpPr>
+          <p:nvPr>
+            <p:ph type="body" idx="1"/>
+          </p:nvPr>
+        </p:nvSpPr>
+        <p:spPr/>
+        <p:txBody>
+          <a:bodyPr/>
+          <a:lstStyle/>
+          <a:p>
+            <a:endParaRPr lang="it-IT" dirty="0"/>
+          </a:p>
+        </p:txBody>
+      </p:sp>
+      <p:sp>
+        <p:nvSpPr>
+          <p:cNvPr id="4" name="Slide Number Placeholder 3">
+            <a:extLst>
+              <a:ext uri="{FF2B5EF4-FFF2-40B4-BE49-F238E27FC236}">
+                <a16:creationId xmlns:a16="http://schemas.microsoft.com/office/drawing/2014/main" id="{4481ABE1-70D9-FA4E-DC2A-02368CE866E9}"/>
+              </a:ext>
+            </a:extLst>
+          </p:cNvPr>
+          <p:cNvSpPr>
+            <a:spLocks noGrp="1"/>
+          </p:cNvSpPr>
+          <p:nvPr>
+            <p:ph type="sldNum" sz="quarter" idx="5"/>
+          </p:nvPr>
+        </p:nvSpPr>
+        <p:spPr/>
+        <p:txBody>
+          <a:bodyPr/>
+          <a:lstStyle/>
+          <a:p>
+            <a:fld id="{55A7B57A-AE85-4914-AC75-AD1AB437EDC3}" type="slidenum">
+              <a:rPr lang="it-IT" smtClean="0"/>
+              <a:t>2</a:t>
+            </a:fld>
+            <a:endParaRPr lang="it-IT"/>
+          </a:p>
+        </p:txBody>
+      </p:sp>
+    </p:spTree>
+    <p:extLst>
+      <p:ext uri="{BB962C8B-B14F-4D97-AF65-F5344CB8AC3E}">
+        <p14:creationId xmlns:p14="http://schemas.microsoft.com/office/powerpoint/2010/main" val="783109998"/>
+      </p:ext>
+    </p:extLst>
+  </p:cSld>
+  <p:clrMapOvr>
+    <a:masterClrMapping/>
+  </p:clrMapOvr>
+</p:notes>
+</file>
+
+<file path=ppt/notesSlides/notesSlide3.xml><?xml version="1.0" encoding="utf-8"?>
+<p:notes xmlns:a="http://schemas.openxmlformats.org/drawingml/2006/main" xmlns:r="http://schemas.openxmlformats.org/officeDocument/2006/relationships" xmlns:p="http://schemas.openxmlformats.org/presentationml/2006/main">
+  <p:cSld>
+    <p:spTree>
+      <p:nvGrpSpPr>
+        <p:cNvPr id="1" name=""/>
+        <p:cNvGrpSpPr/>
+        <p:nvPr/>
+      </p:nvGrpSpPr>
+      <p:grpSpPr>
+        <a:xfrm>
+          <a:off x="0" y="0"/>
+          <a:ext cx="0" cy="0"/>
+          <a:chOff x="0" y="0"/>
+          <a:chExt cx="0" cy="0"/>
+        </a:xfrm>
+      </p:grpSpPr>
+      <p:sp>
+        <p:nvSpPr>
+          <p:cNvPr id="2" name="Slide Image Placeholder 1"/>
+          <p:cNvSpPr>
+            <a:spLocks noGrp="1" noRot="1" noChangeAspect="1"/>
+          </p:cNvSpPr>
+          <p:nvPr>
+            <p:ph type="sldImg"/>
+          </p:nvPr>
+        </p:nvSpPr>
+        <p:spPr/>
+      </p:sp>
+      <p:sp>
+        <p:nvSpPr>
+          <p:cNvPr id="3" name="Notes Placeholder 2"/>
+          <p:cNvSpPr>
+            <a:spLocks noGrp="1"/>
+          </p:cNvSpPr>
+          <p:nvPr>
+            <p:ph type="body" idx="1"/>
+          </p:nvPr>
+        </p:nvSpPr>
+        <p:spPr/>
+        <p:txBody>
+          <a:bodyPr/>
+          <a:lstStyle/>
+          <a:p>
+            <a:endParaRPr lang="it-IT" dirty="0"/>
+          </a:p>
+        </p:txBody>
+      </p:sp>
+      <p:sp>
+        <p:nvSpPr>
+          <p:cNvPr id="4" name="Slide Number Placeholder 3"/>
+          <p:cNvSpPr>
+            <a:spLocks noGrp="1"/>
+          </p:cNvSpPr>
+          <p:nvPr>
+            <p:ph type="sldNum" sz="quarter" idx="5"/>
+          </p:nvPr>
+        </p:nvSpPr>
+        <p:spPr/>
+        <p:txBody>
+          <a:bodyPr/>
+          <a:lstStyle/>
+          <a:p>
+            <a:fld id="{55A7B57A-AE85-4914-AC75-AD1AB437EDC3}" type="slidenum">
+              <a:rPr lang="it-IT" smtClean="0"/>
+              <a:t>3</a:t>
+            </a:fld>
+            <a:endParaRPr lang="it-IT"/>
+          </a:p>
+        </p:txBody>
+      </p:sp>
+    </p:spTree>
+    <p:extLst>
+      <p:ext uri="{BB962C8B-B14F-4D97-AF65-F5344CB8AC3E}">
+        <p14:creationId xmlns:p14="http://schemas.microsoft.com/office/powerpoint/2010/main" val="624531419"/>
+      </p:ext>
+    </p:extLst>
+  </p:cSld>
+  <p:clrMapOvr>
+    <a:masterClrMapping/>
+  </p:clrMapOvr>
+</p:notes>
+</file>
+
 <file path=ppt/slideLayouts/slideLayout1.xml><?xml version="1.0" encoding="utf-8"?>
 <p:sldLayout xmlns:a="http://schemas.openxmlformats.org/drawingml/2006/main" xmlns:r="http://schemas.openxmlformats.org/officeDocument/2006/relationships" xmlns:p="http://schemas.openxmlformats.org/presentationml/2006/main" type="title" preserve="1">
   <p:cSld name="Title Slide">
@@ -267,7 +897,7 @@
           <a:p>
             <a:fld id="{84904564-A16B-46DE-95D6-E3007EDE1A1C}" type="datetimeFigureOut">
               <a:rPr lang="it-IT" smtClean="0"/>
-              <a:t>10/03/2025</a:t>
+              <a:t>11/03/2025</a:t>
             </a:fld>
             <a:endParaRPr lang="it-IT"/>
           </a:p>
@@ -467,7 +1097,7 @@
           <a:p>
             <a:fld id="{84904564-A16B-46DE-95D6-E3007EDE1A1C}" type="datetimeFigureOut">
               <a:rPr lang="it-IT" smtClean="0"/>
-              <a:t>10/03/2025</a:t>
+              <a:t>11/03/2025</a:t>
             </a:fld>
             <a:endParaRPr lang="it-IT"/>
           </a:p>
@@ -677,7 +1307,7 @@
           <a:p>
             <a:fld id="{84904564-A16B-46DE-95D6-E3007EDE1A1C}" type="datetimeFigureOut">
               <a:rPr lang="it-IT" smtClean="0"/>
-              <a:t>10/03/2025</a:t>
+              <a:t>11/03/2025</a:t>
             </a:fld>
             <a:endParaRPr lang="it-IT"/>
           </a:p>
@@ -877,7 +1507,7 @@
           <a:p>
             <a:fld id="{84904564-A16B-46DE-95D6-E3007EDE1A1C}" type="datetimeFigureOut">
               <a:rPr lang="it-IT" smtClean="0"/>
-              <a:t>10/03/2025</a:t>
+              <a:t>11/03/2025</a:t>
             </a:fld>
             <a:endParaRPr lang="it-IT"/>
           </a:p>
@@ -1153,7 +1783,7 @@
           <a:p>
             <a:fld id="{84904564-A16B-46DE-95D6-E3007EDE1A1C}" type="datetimeFigureOut">
               <a:rPr lang="it-IT" smtClean="0"/>
-              <a:t>10/03/2025</a:t>
+              <a:t>11/03/2025</a:t>
             </a:fld>
             <a:endParaRPr lang="it-IT"/>
           </a:p>
@@ -1421,7 +2051,7 @@
           <a:p>
             <a:fld id="{84904564-A16B-46DE-95D6-E3007EDE1A1C}" type="datetimeFigureOut">
               <a:rPr lang="it-IT" smtClean="0"/>
-              <a:t>10/03/2025</a:t>
+              <a:t>11/03/2025</a:t>
             </a:fld>
             <a:endParaRPr lang="it-IT"/>
           </a:p>
@@ -1836,7 +2466,7 @@
           <a:p>
             <a:fld id="{84904564-A16B-46DE-95D6-E3007EDE1A1C}" type="datetimeFigureOut">
               <a:rPr lang="it-IT" smtClean="0"/>
-              <a:t>10/03/2025</a:t>
+              <a:t>11/03/2025</a:t>
             </a:fld>
             <a:endParaRPr lang="it-IT"/>
           </a:p>
@@ -1978,7 +2608,7 @@
           <a:p>
             <a:fld id="{84904564-A16B-46DE-95D6-E3007EDE1A1C}" type="datetimeFigureOut">
               <a:rPr lang="it-IT" smtClean="0"/>
-              <a:t>10/03/2025</a:t>
+              <a:t>11/03/2025</a:t>
             </a:fld>
             <a:endParaRPr lang="it-IT"/>
           </a:p>
@@ -2091,7 +2721,7 @@
           <a:p>
             <a:fld id="{84904564-A16B-46DE-95D6-E3007EDE1A1C}" type="datetimeFigureOut">
               <a:rPr lang="it-IT" smtClean="0"/>
-              <a:t>10/03/2025</a:t>
+              <a:t>11/03/2025</a:t>
             </a:fld>
             <a:endParaRPr lang="it-IT"/>
           </a:p>
@@ -2404,7 +3034,7 @@
           <a:p>
             <a:fld id="{84904564-A16B-46DE-95D6-E3007EDE1A1C}" type="datetimeFigureOut">
               <a:rPr lang="it-IT" smtClean="0"/>
-              <a:t>10/03/2025</a:t>
+              <a:t>11/03/2025</a:t>
             </a:fld>
             <a:endParaRPr lang="it-IT"/>
           </a:p>
@@ -2693,7 +3323,7 @@
           <a:p>
             <a:fld id="{84904564-A16B-46DE-95D6-E3007EDE1A1C}" type="datetimeFigureOut">
               <a:rPr lang="it-IT" smtClean="0"/>
-              <a:t>10/03/2025</a:t>
+              <a:t>11/03/2025</a:t>
             </a:fld>
             <a:endParaRPr lang="it-IT"/>
           </a:p>
@@ -2936,7 +3566,7 @@
           <a:p>
             <a:fld id="{84904564-A16B-46DE-95D6-E3007EDE1A1C}" type="datetimeFigureOut">
               <a:rPr lang="it-IT" smtClean="0"/>
-              <a:t>10/03/2025</a:t>
+              <a:t>11/03/2025</a:t>
             </a:fld>
             <a:endParaRPr lang="it-IT"/>
           </a:p>
@@ -3341,27 +3971,9 @@
   <p:cSld>
     <p:bg>
       <p:bgPr>
-        <a:gradFill rotWithShape="1">
-          <a:gsLst>
-            <a:gs pos="0">
-              <a:schemeClr val="bg2">
-                <a:tint val="90000"/>
-                <a:satMod val="92000"/>
-                <a:lumMod val="120000"/>
-              </a:schemeClr>
-            </a:gs>
-            <a:gs pos="100000">
-              <a:schemeClr val="bg2">
-                <a:shade val="98000"/>
-                <a:satMod val="120000"/>
-                <a:lumMod val="98000"/>
-              </a:schemeClr>
-            </a:gs>
-          </a:gsLst>
-          <a:path path="circle">
-            <a:fillToRect l="50000" t="50000" r="100000" b="100000"/>
-          </a:path>
-        </a:gradFill>
+        <a:solidFill>
+          <a:schemeClr val="bg1"/>
+        </a:solidFill>
         <a:effectLst/>
       </p:bgPr>
     </p:bg>
@@ -3381,10 +3993,10 @@
       </p:grpSpPr>
       <p:sp>
         <p:nvSpPr>
-          <p:cNvPr id="2" name="Title 1">
-            <a:extLst>
-              <a:ext uri="{FF2B5EF4-FFF2-40B4-BE49-F238E27FC236}">
-                <a16:creationId xmlns:a16="http://schemas.microsoft.com/office/drawing/2014/main" id="{4FDEB69F-2A97-7F1C-8280-6E76BA5DB97D}"/>
+          <p:cNvPr id="4" name="Title 3">
+            <a:extLst>
+              <a:ext uri="{FF2B5EF4-FFF2-40B4-BE49-F238E27FC236}">
+                <a16:creationId xmlns:a16="http://schemas.microsoft.com/office/drawing/2014/main" id="{1A22C4AA-AC37-8520-08AF-7E4513CECB90}"/>
               </a:ext>
             </a:extLst>
           </p:cNvPr>
@@ -3395,7 +4007,46 @@
             <p:ph type="ctrTitle"/>
           </p:nvPr>
         </p:nvSpPr>
-        <p:spPr/>
+        <p:spPr>
+          <a:xfrm>
+            <a:off x="1524000" y="577746"/>
+            <a:ext cx="9144000" cy="2387600"/>
+          </a:xfrm>
+        </p:spPr>
+        <p:txBody>
+          <a:bodyPr/>
+          <a:lstStyle/>
+          <a:p>
+            <a:r>
+              <a:rPr lang="en-US" sz="6000" dirty="0"/>
+              <a:t>Exploring the Use of LLMs for Agent Planning</a:t>
+            </a:r>
+            <a:endParaRPr lang="it-IT" dirty="0"/>
+          </a:p>
+        </p:txBody>
+      </p:sp>
+      <p:sp>
+        <p:nvSpPr>
+          <p:cNvPr id="5" name="Subtitle 4">
+            <a:extLst>
+              <a:ext uri="{FF2B5EF4-FFF2-40B4-BE49-F238E27FC236}">
+                <a16:creationId xmlns:a16="http://schemas.microsoft.com/office/drawing/2014/main" id="{796DAB0B-DDFC-7D2C-7991-56CA319B7C5C}"/>
+              </a:ext>
+            </a:extLst>
+          </p:cNvPr>
+          <p:cNvSpPr>
+            <a:spLocks noGrp="1"/>
+          </p:cNvSpPr>
+          <p:nvPr>
+            <p:ph type="subTitle" idx="1"/>
+          </p:nvPr>
+        </p:nvSpPr>
+        <p:spPr>
+          <a:xfrm>
+            <a:off x="1524000" y="3057421"/>
+            <a:ext cx="9144000" cy="1655762"/>
+          </a:xfrm>
+        </p:spPr>
         <p:txBody>
           <a:bodyPr>
             <a:normAutofit/>
@@ -3403,199 +4054,326 @@
           <a:lstStyle/>
           <a:p>
             <a:r>
-              <a:rPr lang="en-US"/>
-              <a:t>Exploring the Use of LLMs for Agent Planning</a:t>
-            </a:r>
-            <a:endParaRPr lang="it-IT"/>
-          </a:p>
-        </p:txBody>
-      </p:sp>
-      <p:sp>
-        <p:nvSpPr>
-          <p:cNvPr id="3" name="Subtitle 2">
-            <a:extLst>
-              <a:ext uri="{FF2B5EF4-FFF2-40B4-BE49-F238E27FC236}">
-                <a16:creationId xmlns:a16="http://schemas.microsoft.com/office/drawing/2014/main" id="{16D92F91-9059-F42D-7361-1B2BA83EC766}"/>
-              </a:ext>
-            </a:extLst>
-          </p:cNvPr>
-          <p:cNvSpPr>
-            <a:spLocks noGrp="1"/>
-          </p:cNvSpPr>
-          <p:nvPr>
-            <p:ph type="subTitle" idx="1"/>
-          </p:nvPr>
-        </p:nvSpPr>
-        <p:spPr/>
-        <p:txBody>
-          <a:bodyPr>
-            <a:normAutofit/>
-          </a:bodyPr>
-          <a:lstStyle/>
-          <a:p>
-            <a:r>
-              <a:rPr lang="en-US"/>
+              <a:rPr lang="en-US" sz="4500" dirty="0"/>
               <a:t>Strengths and Weaknesses</a:t>
             </a:r>
-            <a:endParaRPr lang="it-IT"/>
-          </a:p>
-        </p:txBody>
-      </p:sp>
+            <a:endParaRPr lang="it-IT" sz="4500" dirty="0"/>
+          </a:p>
+        </p:txBody>
+      </p:sp>
+      <p:pic>
+        <p:nvPicPr>
+          <p:cNvPr id="8" name="Picture 7" descr="A black background with white text&#10;&#10;AI-generated content may be incorrect.">
+            <a:extLst>
+              <a:ext uri="{FF2B5EF4-FFF2-40B4-BE49-F238E27FC236}">
+                <a16:creationId xmlns:a16="http://schemas.microsoft.com/office/drawing/2014/main" id="{5D27BBA9-CE1D-DD49-2580-11D19A430265}"/>
+              </a:ext>
+            </a:extLst>
+          </p:cNvPr>
+          <p:cNvPicPr>
+            <a:picLocks noChangeAspect="1"/>
+          </p:cNvPicPr>
+          <p:nvPr/>
+        </p:nvPicPr>
+        <p:blipFill>
+          <a:blip r:embed="rId3">
+            <a:extLst>
+              <a:ext uri="{28A0092B-C50C-407E-A947-70E740481C1C}">
+                <a14:useLocalDpi xmlns:a14="http://schemas.microsoft.com/office/drawing/2010/main" val="0"/>
+              </a:ext>
+            </a:extLst>
+          </a:blip>
+          <a:stretch>
+            <a:fillRect/>
+          </a:stretch>
+        </p:blipFill>
+        <p:spPr>
+          <a:xfrm>
+            <a:off x="1524000" y="4982729"/>
+            <a:ext cx="2089495" cy="647947"/>
+          </a:xfrm>
+          <a:prstGeom prst="rect">
+            <a:avLst/>
+          </a:prstGeom>
+        </p:spPr>
+      </p:pic>
+      <p:grpSp>
+        <p:nvGrpSpPr>
+          <p:cNvPr id="13" name="Group 12">
+            <a:extLst>
+              <a:ext uri="{FF2B5EF4-FFF2-40B4-BE49-F238E27FC236}">
+                <a16:creationId xmlns:a16="http://schemas.microsoft.com/office/drawing/2014/main" id="{816C4CEA-4E19-8710-178D-227568B6E201}"/>
+              </a:ext>
+            </a:extLst>
+          </p:cNvPr>
+          <p:cNvGrpSpPr/>
+          <p:nvPr/>
+        </p:nvGrpSpPr>
+        <p:grpSpPr>
+          <a:xfrm>
+            <a:off x="7596069" y="4805258"/>
+            <a:ext cx="3071931" cy="1017279"/>
+            <a:chOff x="8577883" y="5633774"/>
+            <a:chExt cx="3071931" cy="1017279"/>
+          </a:xfrm>
+        </p:grpSpPr>
+        <p:sp>
+          <p:nvSpPr>
+            <p:cNvPr id="9" name="TextBox 8">
+              <a:extLst>
+                <a:ext uri="{FF2B5EF4-FFF2-40B4-BE49-F238E27FC236}">
+                  <a16:creationId xmlns:a16="http://schemas.microsoft.com/office/drawing/2014/main" id="{151EB2AF-DE76-5CB3-FE06-ADDC13A97646}"/>
+                </a:ext>
+              </a:extLst>
+            </p:cNvPr>
+            <p:cNvSpPr txBox="1"/>
+            <p:nvPr/>
+          </p:nvSpPr>
+          <p:spPr>
+            <a:xfrm>
+              <a:off x="10320604" y="5912389"/>
+              <a:ext cx="1329210" cy="369332"/>
+            </a:xfrm>
+            <a:prstGeom prst="rect">
+              <a:avLst/>
+            </a:prstGeom>
+            <a:noFill/>
+          </p:spPr>
+          <p:txBody>
+            <a:bodyPr wrap="none" rtlCol="0">
+              <a:spAutoFit/>
+            </a:bodyPr>
+            <a:lstStyle/>
+            <a:p>
+              <a:pPr algn="r"/>
+              <a:r>
+                <a:rPr lang="en-US" dirty="0"/>
+                <a:t>20/03/2025</a:t>
+              </a:r>
+              <a:endParaRPr lang="it-IT" dirty="0"/>
+            </a:p>
+          </p:txBody>
+        </p:sp>
+        <p:sp>
+          <p:nvSpPr>
+            <p:cNvPr id="10" name="TextBox 9">
+              <a:extLst>
+                <a:ext uri="{FF2B5EF4-FFF2-40B4-BE49-F238E27FC236}">
+                  <a16:creationId xmlns:a16="http://schemas.microsoft.com/office/drawing/2014/main" id="{50B5C11A-0D86-6A1A-7A91-452813D95A86}"/>
+                </a:ext>
+              </a:extLst>
+            </p:cNvPr>
+            <p:cNvSpPr txBox="1"/>
+            <p:nvPr/>
+          </p:nvSpPr>
+          <p:spPr>
+            <a:xfrm>
+              <a:off x="9644521" y="5633774"/>
+              <a:ext cx="2005293" cy="369332"/>
+            </a:xfrm>
+            <a:prstGeom prst="rect">
+              <a:avLst/>
+            </a:prstGeom>
+            <a:noFill/>
+          </p:spPr>
+          <p:txBody>
+            <a:bodyPr wrap="none" rtlCol="0">
+              <a:spAutoFit/>
+            </a:bodyPr>
+            <a:lstStyle/>
+            <a:p>
+              <a:pPr algn="r"/>
+              <a:r>
+                <a:rPr lang="en-US" b="1" dirty="0"/>
+                <a:t>DAVIDE MODOLO</a:t>
+              </a:r>
+              <a:endParaRPr lang="it-IT" b="1" dirty="0"/>
+            </a:p>
+          </p:txBody>
+        </p:sp>
+        <p:sp>
+          <p:nvSpPr>
+            <p:cNvPr id="11" name="TextBox 10">
+              <a:extLst>
+                <a:ext uri="{FF2B5EF4-FFF2-40B4-BE49-F238E27FC236}">
+                  <a16:creationId xmlns:a16="http://schemas.microsoft.com/office/drawing/2014/main" id="{65D2AFF5-E67D-1B4C-2DAC-907216315A24}"/>
+                </a:ext>
+              </a:extLst>
+            </p:cNvPr>
+            <p:cNvSpPr txBox="1"/>
+            <p:nvPr/>
+          </p:nvSpPr>
+          <p:spPr>
+            <a:xfrm>
+              <a:off x="8577883" y="6281721"/>
+              <a:ext cx="3071930" cy="369332"/>
+            </a:xfrm>
+            <a:prstGeom prst="rect">
+              <a:avLst/>
+            </a:prstGeom>
+            <a:noFill/>
+          </p:spPr>
+          <p:txBody>
+            <a:bodyPr wrap="none" rtlCol="0">
+              <a:spAutoFit/>
+            </a:bodyPr>
+            <a:lstStyle/>
+            <a:p>
+              <a:pPr algn="r"/>
+              <a:r>
+                <a:rPr lang="en-US" i="1" dirty="0"/>
+                <a:t>Supervisor: PAOLO GIORGINI</a:t>
+              </a:r>
+              <a:endParaRPr lang="it-IT" i="1" dirty="0"/>
+            </a:p>
+          </p:txBody>
+        </p:sp>
+      </p:grpSp>
     </p:spTree>
     <p:extLst>
       <p:ext uri="{BB962C8B-B14F-4D97-AF65-F5344CB8AC3E}">
-        <p14:creationId xmlns:p14="http://schemas.microsoft.com/office/powerpoint/2010/main" val="959678063"/>
+        <p14:creationId xmlns:p14="http://schemas.microsoft.com/office/powerpoint/2010/main" val="3983380403"/>
       </p:ext>
     </p:extLst>
   </p:cSld>
   <p:clrMapOvr>
     <a:masterClrMapping/>
   </p:clrMapOvr>
-  <p:timing>
-    <p:tnLst>
-      <p:par>
-        <p:cTn id="1" dur="indefinite" restart="never" nodeType="tmRoot">
-          <p:childTnLst>
-            <p:seq concurrent="1" nextAc="seek">
-              <p:cTn id="2" dur="indefinite" nodeType="mainSeq">
-                <p:childTnLst>
-                  <p:par>
-                    <p:cTn id="3" fill="hold">
-                      <p:stCondLst>
-                        <p:cond delay="indefinite"/>
-                        <p:cond evt="onBegin" delay="0">
-                          <p:tn val="2"/>
-                        </p:cond>
-                      </p:stCondLst>
-                      <p:childTnLst>
-                        <p:par>
-                          <p:cTn id="4" fill="hold">
-                            <p:stCondLst>
-                              <p:cond delay="0"/>
-                            </p:stCondLst>
-                            <p:childTnLst>
-                              <p:par>
-                                <p:cTn id="5" presetID="10" presetClass="entr" presetSubtype="0" fill="hold" grpId="0" nodeType="withEffect">
-                                  <p:stCondLst>
-                                    <p:cond delay="1000"/>
-                                  </p:stCondLst>
-                                  <p:iterate>
-                                    <p:tmPct val="10000"/>
-                                  </p:iterate>
-                                  <p:childTnLst>
-                                    <p:set>
-                                      <p:cBhvr>
-                                        <p:cTn id="6" dur="1" fill="hold">
-                                          <p:stCondLst>
-                                            <p:cond delay="0"/>
-                                          </p:stCondLst>
-                                        </p:cTn>
-                                        <p:tgtEl>
-                                          <p:spTgt spid="2"/>
-                                        </p:tgtEl>
-                                        <p:attrNameLst>
-                                          <p:attrName>style.visibility</p:attrName>
-                                        </p:attrNameLst>
-                                      </p:cBhvr>
-                                      <p:to>
-                                        <p:strVal val="visible"/>
-                                      </p:to>
-                                    </p:set>
-                                    <p:animEffect transition="in" filter="fade">
-                                      <p:cBhvr>
-                                        <p:cTn id="7" dur="700"/>
-                                        <p:tgtEl>
-                                          <p:spTgt spid="2"/>
-                                        </p:tgtEl>
-                                      </p:cBhvr>
-                                    </p:animEffect>
-                                  </p:childTnLst>
-                                </p:cTn>
-                              </p:par>
-                              <p:par>
-                                <p:cTn id="8" presetID="10" presetClass="entr" presetSubtype="0" fill="hold" grpId="0" nodeType="withEffect">
-                                  <p:stCondLst>
-                                    <p:cond delay="1500"/>
-                                  </p:stCondLst>
-                                  <p:iterate>
-                                    <p:tmPct val="10000"/>
-                                  </p:iterate>
-                                  <p:childTnLst>
-                                    <p:set>
-                                      <p:cBhvr>
-                                        <p:cTn id="9" dur="1" fill="hold">
-                                          <p:stCondLst>
-                                            <p:cond delay="0"/>
-                                          </p:stCondLst>
-                                        </p:cTn>
-                                        <p:tgtEl>
-                                          <p:spTgt spid="3">
-                                            <p:txEl>
-                                              <p:pRg st="0" end="0"/>
-                                            </p:txEl>
-                                          </p:spTgt>
-                                        </p:tgtEl>
-                                        <p:attrNameLst>
-                                          <p:attrName>style.visibility</p:attrName>
-                                        </p:attrNameLst>
-                                      </p:cBhvr>
-                                      <p:to>
-                                        <p:strVal val="visible"/>
-                                      </p:to>
-                                    </p:set>
-                                    <p:animEffect transition="in" filter="fade">
-                                      <p:cBhvr>
-                                        <p:cTn id="10" dur="700"/>
-                                        <p:tgtEl>
-                                          <p:spTgt spid="3">
-                                            <p:txEl>
-                                              <p:pRg st="0" end="0"/>
-                                            </p:txEl>
-                                          </p:spTgt>
-                                        </p:tgtEl>
-                                      </p:cBhvr>
-                                    </p:animEffect>
-                                  </p:childTnLst>
-                                </p:cTn>
-                              </p:par>
-                            </p:childTnLst>
-                          </p:cTn>
-                        </p:par>
-                      </p:childTnLst>
-                    </p:cTn>
-                  </p:par>
-                </p:childTnLst>
-              </p:cTn>
-              <p:prevCondLst>
-                <p:cond evt="onPrev" delay="0">
-                  <p:tgtEl>
-                    <p:sldTgt/>
-                  </p:tgtEl>
-                </p:cond>
-              </p:prevCondLst>
-              <p:nextCondLst>
-                <p:cond evt="onNext" delay="0">
-                  <p:tgtEl>
-                    <p:sldTgt/>
-                  </p:tgtEl>
-                </p:cond>
-              </p:nextCondLst>
-            </p:seq>
-          </p:childTnLst>
-        </p:cTn>
-      </p:par>
-    </p:tnLst>
-    <p:bldLst>
-      <p:bldP spid="2" grpId="0"/>
-      <p:bldP spid="3" grpId="0" build="p"/>
-    </p:bldLst>
-  </p:timing>
 </p:sld>
 </file>
 
 <file path=ppt/slides/slide2.xml><?xml version="1.0" encoding="utf-8"?>
 <p:sld xmlns:a="http://schemas.openxmlformats.org/drawingml/2006/main" xmlns:r="http://schemas.openxmlformats.org/officeDocument/2006/relationships" xmlns:p="http://schemas.openxmlformats.org/presentationml/2006/main">
   <p:cSld>
+    <p:bg>
+      <p:bgPr>
+        <a:solidFill>
+          <a:schemeClr val="bg1"/>
+        </a:solidFill>
+        <a:effectLst/>
+      </p:bgPr>
+    </p:bg>
+    <p:spTree>
+      <p:nvGrpSpPr>
+        <p:cNvPr id="1" name="">
+          <a:extLst>
+            <a:ext uri="{FF2B5EF4-FFF2-40B4-BE49-F238E27FC236}">
+              <a16:creationId xmlns:a16="http://schemas.microsoft.com/office/drawing/2014/main" id="{72F75454-8483-6F5D-3FFF-FA1F934C0455}"/>
+            </a:ext>
+          </a:extLst>
+        </p:cNvPr>
+        <p:cNvGrpSpPr/>
+        <p:nvPr/>
+      </p:nvGrpSpPr>
+      <p:grpSpPr>
+        <a:xfrm>
+          <a:off x="0" y="0"/>
+          <a:ext cx="0" cy="0"/>
+          <a:chOff x="0" y="0"/>
+          <a:chExt cx="0" cy="0"/>
+        </a:xfrm>
+      </p:grpSpPr>
+      <p:sp>
+        <p:nvSpPr>
+          <p:cNvPr id="14" name="Rectangle: Rounded Corners 13">
+            <a:extLst>
+              <a:ext uri="{FF2B5EF4-FFF2-40B4-BE49-F238E27FC236}">
+                <a16:creationId xmlns:a16="http://schemas.microsoft.com/office/drawing/2014/main" id="{8762A47D-CFEC-449A-7E56-112FA84A4035}"/>
+              </a:ext>
+            </a:extLst>
+          </p:cNvPr>
+          <p:cNvSpPr/>
+          <p:nvPr/>
+        </p:nvSpPr>
+        <p:spPr>
+          <a:xfrm>
+            <a:off x="3402106" y="4538382"/>
+            <a:ext cx="3341594" cy="1620370"/>
+          </a:xfrm>
+          <a:prstGeom prst="roundRect">
+            <a:avLst/>
+          </a:prstGeom>
+          <a:solidFill>
+            <a:srgbClr val="EFF9EB"/>
+          </a:solidFill>
+        </p:spPr>
+        <p:style>
+          <a:lnRef idx="2">
+            <a:schemeClr val="accent1">
+              <a:shade val="15000"/>
+            </a:schemeClr>
+          </a:lnRef>
+          <a:fillRef idx="1">
+            <a:schemeClr val="accent1"/>
+          </a:fillRef>
+          <a:effectRef idx="0">
+            <a:schemeClr val="accent1"/>
+          </a:effectRef>
+          <a:fontRef idx="minor">
+            <a:schemeClr val="lt1"/>
+          </a:fontRef>
+        </p:style>
+        <p:txBody>
+          <a:bodyPr rtlCol="0" anchor="ctr"/>
+          <a:lstStyle/>
+          <a:p>
+            <a:pPr algn="ctr"/>
+            <a:r>
+              <a:rPr lang="en-US" dirty="0">
+                <a:ln w="0"/>
+                <a:solidFill>
+                  <a:schemeClr val="tx1"/>
+                </a:solidFill>
+                <a:effectLst>
+                  <a:outerShdw blurRad="38100" dist="19050" dir="2700000" algn="tl" rotWithShape="0">
+                    <a:schemeClr val="dk1">
+                      <a:alpha val="40000"/>
+                    </a:schemeClr>
+                  </a:outerShdw>
+                </a:effectLst>
+              </a:rPr>
+              <a:t>TEXT GENERATION</a:t>
+            </a:r>
+            <a:endParaRPr lang="it-IT" dirty="0">
+              <a:ln w="0"/>
+              <a:solidFill>
+                <a:schemeClr val="tx1"/>
+              </a:solidFill>
+              <a:effectLst>
+                <a:outerShdw blurRad="38100" dist="19050" dir="2700000" algn="tl" rotWithShape="0">
+                  <a:schemeClr val="dk1">
+                    <a:alpha val="40000"/>
+                  </a:schemeClr>
+                </a:outerShdw>
+              </a:effectLst>
+            </a:endParaRPr>
+          </a:p>
+        </p:txBody>
+      </p:sp>
+    </p:spTree>
+    <p:extLst>
+      <p:ext uri="{BB962C8B-B14F-4D97-AF65-F5344CB8AC3E}">
+        <p14:creationId xmlns:p14="http://schemas.microsoft.com/office/powerpoint/2010/main" val="4096116324"/>
+      </p:ext>
+    </p:extLst>
+  </p:cSld>
+  <p:clrMapOvr>
+    <a:masterClrMapping/>
+  </p:clrMapOvr>
+</p:sld>
+</file>
+
+<file path=ppt/slides/slide3.xml><?xml version="1.0" encoding="utf-8"?>
+<p:sld xmlns:a="http://schemas.openxmlformats.org/drawingml/2006/main" xmlns:r="http://schemas.openxmlformats.org/officeDocument/2006/relationships" xmlns:p="http://schemas.openxmlformats.org/presentationml/2006/main">
+  <p:cSld>
+    <p:bg>
+      <p:bgPr>
+        <a:solidFill>
+          <a:srgbClr val="EFF9EB"/>
+        </a:solidFill>
+        <a:effectLst/>
+      </p:bgPr>
+    </p:bg>
     <p:spTree>
       <p:nvGrpSpPr>
         <p:cNvPr id="1" name=""/>
@@ -3679,118 +4457,46 @@
           </a:p>
         </p:txBody>
       </p:sp>
+      <p:pic>
+        <p:nvPicPr>
+          <p:cNvPr id="7" name="Picture 6" descr="A black background with white text&#10;&#10;AI-generated content may be incorrect.">
+            <a:extLst>
+              <a:ext uri="{FF2B5EF4-FFF2-40B4-BE49-F238E27FC236}">
+                <a16:creationId xmlns:a16="http://schemas.microsoft.com/office/drawing/2014/main" id="{2DD9F249-55F8-72ED-D679-ABE2C6F9A5C5}"/>
+              </a:ext>
+            </a:extLst>
+          </p:cNvPr>
+          <p:cNvPicPr>
+            <a:picLocks noChangeAspect="1"/>
+          </p:cNvPicPr>
+          <p:nvPr/>
+        </p:nvPicPr>
+        <p:blipFill>
+          <a:blip r:embed="rId3">
+            <a:extLst>
+              <a:ext uri="{28A0092B-C50C-407E-A947-70E740481C1C}">
+                <a14:useLocalDpi xmlns:a14="http://schemas.microsoft.com/office/drawing/2010/main" val="0"/>
+              </a:ext>
+            </a:extLst>
+          </a:blip>
+          <a:stretch>
+            <a:fillRect/>
+          </a:stretch>
+        </p:blipFill>
+        <p:spPr>
+          <a:xfrm>
+            <a:off x="0" y="5171492"/>
+            <a:ext cx="5438633" cy="1686508"/>
+          </a:xfrm>
+          <a:prstGeom prst="rect">
+            <a:avLst/>
+          </a:prstGeom>
+        </p:spPr>
+      </p:pic>
     </p:spTree>
     <p:extLst>
       <p:ext uri="{BB962C8B-B14F-4D97-AF65-F5344CB8AC3E}">
         <p14:creationId xmlns:p14="http://schemas.microsoft.com/office/powerpoint/2010/main" val="3063508011"/>
-      </p:ext>
-    </p:extLst>
-  </p:cSld>
-  <p:clrMapOvr>
-    <a:masterClrMapping/>
-  </p:clrMapOvr>
-</p:sld>
-</file>
-
-<file path=ppt/slides/slide3.xml><?xml version="1.0" encoding="utf-8"?>
-<p:sld xmlns:a="http://schemas.openxmlformats.org/drawingml/2006/main" xmlns:r="http://schemas.openxmlformats.org/officeDocument/2006/relationships" xmlns:p="http://schemas.openxmlformats.org/presentationml/2006/main">
-  <p:cSld>
-    <p:spTree>
-      <p:nvGrpSpPr>
-        <p:cNvPr id="1" name=""/>
-        <p:cNvGrpSpPr/>
-        <p:nvPr/>
-      </p:nvGrpSpPr>
-      <p:grpSpPr>
-        <a:xfrm>
-          <a:off x="0" y="0"/>
-          <a:ext cx="0" cy="0"/>
-          <a:chOff x="0" y="0"/>
-          <a:chExt cx="0" cy="0"/>
-        </a:xfrm>
-      </p:grpSpPr>
-      <p:sp>
-        <p:nvSpPr>
-          <p:cNvPr id="2" name="Title 1">
-            <a:extLst>
-              <a:ext uri="{FF2B5EF4-FFF2-40B4-BE49-F238E27FC236}">
-                <a16:creationId xmlns:a16="http://schemas.microsoft.com/office/drawing/2014/main" id="{09442480-F70F-BBE7-F9D9-85AD7D4A8A57}"/>
-              </a:ext>
-            </a:extLst>
-          </p:cNvPr>
-          <p:cNvSpPr>
-            <a:spLocks noGrp="1"/>
-          </p:cNvSpPr>
-          <p:nvPr>
-            <p:ph type="title"/>
-          </p:nvPr>
-        </p:nvSpPr>
-        <p:spPr/>
-        <p:txBody>
-          <a:bodyPr/>
-          <a:lstStyle/>
-          <a:p>
-            <a:r>
-              <a:rPr lang="en-US" dirty="0"/>
-              <a:t>Research Questions</a:t>
-            </a:r>
-            <a:endParaRPr lang="it-IT" dirty="0"/>
-          </a:p>
-        </p:txBody>
-      </p:sp>
-      <p:sp>
-        <p:nvSpPr>
-          <p:cNvPr id="3" name="Content Placeholder 2">
-            <a:extLst>
-              <a:ext uri="{FF2B5EF4-FFF2-40B4-BE49-F238E27FC236}">
-                <a16:creationId xmlns:a16="http://schemas.microsoft.com/office/drawing/2014/main" id="{44543A94-C08A-7FB5-2DDA-AD8AF3CF7E58}"/>
-              </a:ext>
-            </a:extLst>
-          </p:cNvPr>
-          <p:cNvSpPr>
-            <a:spLocks noGrp="1"/>
-          </p:cNvSpPr>
-          <p:nvPr>
-            <p:ph idx="1"/>
-          </p:nvPr>
-        </p:nvSpPr>
-        <p:spPr/>
-        <p:txBody>
-          <a:bodyPr/>
-          <a:lstStyle/>
-          <a:p>
-            <a:r>
-              <a:rPr lang="en-US" b="0" dirty="0">
-                <a:solidFill>
-                  <a:srgbClr val="000000"/>
-                </a:solidFill>
-                <a:effectLst/>
-                <a:latin typeface="Consolas" panose="020B0609020204030204" pitchFamily="49" charset="0"/>
-              </a:rPr>
-              <a:t>Can an LLM, without additional training or frameworks, effectively plan and navigate in an unknown environment?</a:t>
-            </a:r>
-          </a:p>
-          <a:p>
-            <a:r>
-              <a:rPr lang="en-US" b="0" dirty="0">
-                <a:solidFill>
-                  <a:srgbClr val="000000"/>
-                </a:solidFill>
-                <a:effectLst/>
-                <a:latin typeface="Consolas" panose="020B0609020204030204" pitchFamily="49" charset="0"/>
-              </a:rPr>
-              <a:t>evaluate how well LLMs can make sequential decisions in real-time environments</a:t>
-            </a:r>
-          </a:p>
-          <a:p>
-            <a:endParaRPr lang="it-IT" dirty="0"/>
-          </a:p>
-        </p:txBody>
-      </p:sp>
-    </p:spTree>
-    <p:extLst>
-      <p:ext uri="{BB962C8B-B14F-4D97-AF65-F5344CB8AC3E}">
-        <p14:creationId xmlns:p14="http://schemas.microsoft.com/office/powerpoint/2010/main" val="3081350896"/>
       </p:ext>
     </p:extLst>
   </p:cSld>
@@ -3822,7 +4528,7 @@
           <p:cNvPr id="2" name="Title 1">
             <a:extLst>
               <a:ext uri="{FF2B5EF4-FFF2-40B4-BE49-F238E27FC236}">
-                <a16:creationId xmlns:a16="http://schemas.microsoft.com/office/drawing/2014/main" id="{A3BD5117-7868-512B-F72D-0F3387E4F6AC}"/>
+                <a16:creationId xmlns:a16="http://schemas.microsoft.com/office/drawing/2014/main" id="{09442480-F70F-BBE7-F9D9-85AD7D4A8A57}"/>
               </a:ext>
             </a:extLst>
           </p:cNvPr>
@@ -3840,7 +4546,7 @@
           <a:p>
             <a:r>
               <a:rPr lang="en-US" dirty="0"/>
-              <a:t>Experiment Setting</a:t>
+              <a:t>Research Questions</a:t>
             </a:r>
             <a:endParaRPr lang="it-IT" dirty="0"/>
           </a:p>
@@ -3851,7 +4557,7 @@
           <p:cNvPr id="3" name="Content Placeholder 2">
             <a:extLst>
               <a:ext uri="{FF2B5EF4-FFF2-40B4-BE49-F238E27FC236}">
-                <a16:creationId xmlns:a16="http://schemas.microsoft.com/office/drawing/2014/main" id="{26EE99AD-C6EA-973C-5425-EE171E8F74BF}"/>
+                <a16:creationId xmlns:a16="http://schemas.microsoft.com/office/drawing/2014/main" id="{44543A94-C08A-7FB5-2DDA-AD8AF3CF7E58}"/>
               </a:ext>
             </a:extLst>
           </p:cNvPr>
@@ -3868,41 +4574,37 @@
           <a:lstStyle/>
           <a:p>
             <a:r>
-              <a:rPr lang="en-US" dirty="0"/>
-              <a:t>Deliveroo.js</a:t>
-            </a:r>
-          </a:p>
-          <a:p>
-            <a:r>
-              <a:rPr lang="en-US" dirty="0" err="1"/>
-              <a:t>KnowNo</a:t>
-            </a:r>
-            <a:endParaRPr lang="en-US" dirty="0"/>
-          </a:p>
-          <a:p>
-            <a:r>
-              <a:rPr lang="en-US" dirty="0"/>
-              <a:t>Prompting Strategy</a:t>
-            </a:r>
-          </a:p>
-          <a:p>
-            <a:r>
-              <a:rPr lang="en-US" dirty="0"/>
-              <a:t>Main Model Used</a:t>
-            </a:r>
-          </a:p>
-          <a:p>
-            <a:r>
-              <a:rPr lang="it-IT" dirty="0"/>
-              <a:t>Agent</a:t>
-            </a:r>
+              <a:rPr lang="en-US" b="0" dirty="0">
+                <a:solidFill>
+                  <a:srgbClr val="000000"/>
+                </a:solidFill>
+                <a:effectLst/>
+                <a:latin typeface="Consolas" panose="020B0609020204030204" pitchFamily="49" charset="0"/>
+              </a:rPr>
+              <a:t>Can an LLM, without additional training or frameworks, effectively plan and navigate in an unknown environment?</a:t>
+            </a:r>
+          </a:p>
+          <a:p>
+            <a:r>
+              <a:rPr lang="en-US" b="0" dirty="0">
+                <a:solidFill>
+                  <a:srgbClr val="000000"/>
+                </a:solidFill>
+                <a:effectLst/>
+                <a:latin typeface="Consolas" panose="020B0609020204030204" pitchFamily="49" charset="0"/>
+              </a:rPr>
+              <a:t>evaluate how well LLMs can make sequential decisions in real-time environments</a:t>
+            </a:r>
+          </a:p>
+          <a:p>
+            <a:endParaRPr lang="it-IT" dirty="0"/>
           </a:p>
         </p:txBody>
       </p:sp>
     </p:spTree>
     <p:extLst>
       <p:ext uri="{BB962C8B-B14F-4D97-AF65-F5344CB8AC3E}">
-        <p14:creationId xmlns:p14="http://schemas.microsoft.com/office/powerpoint/2010/main" val="1213108665"/>
+        <p14:creationId xmlns:p14="http://schemas.microsoft.com/office/powerpoint/2010/main" val="3081350896"/>
       </p:ext>
     </p:extLst>
   </p:cSld>
@@ -3934,7 +4636,7 @@
           <p:cNvPr id="2" name="Title 1">
             <a:extLst>
               <a:ext uri="{FF2B5EF4-FFF2-40B4-BE49-F238E27FC236}">
-                <a16:creationId xmlns:a16="http://schemas.microsoft.com/office/drawing/2014/main" id="{A70B027C-0E3D-7E3A-B579-6EBAD4D428B1}"/>
+                <a16:creationId xmlns:a16="http://schemas.microsoft.com/office/drawing/2014/main" id="{A3BD5117-7868-512B-F72D-0F3387E4F6AC}"/>
               </a:ext>
             </a:extLst>
           </p:cNvPr>
@@ -3952,7 +4654,7 @@
           <a:p>
             <a:r>
               <a:rPr lang="en-US" dirty="0"/>
-              <a:t>Data Collection</a:t>
+              <a:t>Experiment Setting</a:t>
             </a:r>
             <a:endParaRPr lang="it-IT" dirty="0"/>
           </a:p>
@@ -3963,7 +4665,7 @@
           <p:cNvPr id="3" name="Content Placeholder 2">
             <a:extLst>
               <a:ext uri="{FF2B5EF4-FFF2-40B4-BE49-F238E27FC236}">
-                <a16:creationId xmlns:a16="http://schemas.microsoft.com/office/drawing/2014/main" id="{CE840BEE-C797-9B29-E82E-2815C2C438E5}"/>
+                <a16:creationId xmlns:a16="http://schemas.microsoft.com/office/drawing/2014/main" id="{26EE99AD-C6EA-973C-5425-EE171E8F74BF}"/>
               </a:ext>
             </a:extLst>
           </p:cNvPr>
@@ -3981,27 +4683,40 @@
           <a:p>
             <a:r>
               <a:rPr lang="en-US" dirty="0"/>
-              <a:t>HM</a:t>
-            </a:r>
+              <a:t>Deliveroo.js</a:t>
+            </a:r>
+          </a:p>
+          <a:p>
+            <a:r>
+              <a:rPr lang="en-US" dirty="0" err="1"/>
+              <a:t>KnowNo</a:t>
+            </a:r>
+            <a:endParaRPr lang="en-US" dirty="0"/>
           </a:p>
           <a:p>
             <a:r>
               <a:rPr lang="en-US" dirty="0"/>
-              <a:t>CHM</a:t>
-            </a:r>
-          </a:p>
-          <a:p>
-            <a:pPr marL="0" indent="0">
-              <a:buNone/>
-            </a:pPr>
-            <a:endParaRPr lang="it-IT" dirty="0"/>
+              <a:t>Prompting Strategy</a:t>
+            </a:r>
+          </a:p>
+          <a:p>
+            <a:r>
+              <a:rPr lang="en-US" dirty="0"/>
+              <a:t>Main Model Used</a:t>
+            </a:r>
+          </a:p>
+          <a:p>
+            <a:r>
+              <a:rPr lang="it-IT" dirty="0"/>
+              <a:t>Agent</a:t>
+            </a:r>
           </a:p>
         </p:txBody>
       </p:sp>
     </p:spTree>
     <p:extLst>
       <p:ext uri="{BB962C8B-B14F-4D97-AF65-F5344CB8AC3E}">
-        <p14:creationId xmlns:p14="http://schemas.microsoft.com/office/powerpoint/2010/main" val="1569455533"/>
+        <p14:creationId xmlns:p14="http://schemas.microsoft.com/office/powerpoint/2010/main" val="1213108665"/>
       </p:ext>
     </p:extLst>
   </p:cSld>
@@ -4033,6 +4748,105 @@
           <p:cNvPr id="2" name="Title 1">
             <a:extLst>
               <a:ext uri="{FF2B5EF4-FFF2-40B4-BE49-F238E27FC236}">
+                <a16:creationId xmlns:a16="http://schemas.microsoft.com/office/drawing/2014/main" id="{A70B027C-0E3D-7E3A-B579-6EBAD4D428B1}"/>
+              </a:ext>
+            </a:extLst>
+          </p:cNvPr>
+          <p:cNvSpPr>
+            <a:spLocks noGrp="1"/>
+          </p:cNvSpPr>
+          <p:nvPr>
+            <p:ph type="title"/>
+          </p:nvPr>
+        </p:nvSpPr>
+        <p:spPr/>
+        <p:txBody>
+          <a:bodyPr/>
+          <a:lstStyle/>
+          <a:p>
+            <a:r>
+              <a:rPr lang="en-US" dirty="0"/>
+              <a:t>Data Collection</a:t>
+            </a:r>
+            <a:endParaRPr lang="it-IT" dirty="0"/>
+          </a:p>
+        </p:txBody>
+      </p:sp>
+      <p:sp>
+        <p:nvSpPr>
+          <p:cNvPr id="3" name="Content Placeholder 2">
+            <a:extLst>
+              <a:ext uri="{FF2B5EF4-FFF2-40B4-BE49-F238E27FC236}">
+                <a16:creationId xmlns:a16="http://schemas.microsoft.com/office/drawing/2014/main" id="{CE840BEE-C797-9B29-E82E-2815C2C438E5}"/>
+              </a:ext>
+            </a:extLst>
+          </p:cNvPr>
+          <p:cNvSpPr>
+            <a:spLocks noGrp="1"/>
+          </p:cNvSpPr>
+          <p:nvPr>
+            <p:ph idx="1"/>
+          </p:nvPr>
+        </p:nvSpPr>
+        <p:spPr/>
+        <p:txBody>
+          <a:bodyPr/>
+          <a:lstStyle/>
+          <a:p>
+            <a:r>
+              <a:rPr lang="en-US" dirty="0"/>
+              <a:t>HM</a:t>
+            </a:r>
+          </a:p>
+          <a:p>
+            <a:r>
+              <a:rPr lang="en-US" dirty="0"/>
+              <a:t>CHM</a:t>
+            </a:r>
+          </a:p>
+          <a:p>
+            <a:pPr marL="0" indent="0">
+              <a:buNone/>
+            </a:pPr>
+            <a:endParaRPr lang="it-IT" dirty="0"/>
+          </a:p>
+        </p:txBody>
+      </p:sp>
+    </p:spTree>
+    <p:extLst>
+      <p:ext uri="{BB962C8B-B14F-4D97-AF65-F5344CB8AC3E}">
+        <p14:creationId xmlns:p14="http://schemas.microsoft.com/office/powerpoint/2010/main" val="1569455533"/>
+      </p:ext>
+    </p:extLst>
+  </p:cSld>
+  <p:clrMapOvr>
+    <a:masterClrMapping/>
+  </p:clrMapOvr>
+</p:sld>
+</file>
+
+<file path=ppt/slides/slide7.xml><?xml version="1.0" encoding="utf-8"?>
+<p:sld xmlns:a="http://schemas.openxmlformats.org/drawingml/2006/main" xmlns:r="http://schemas.openxmlformats.org/officeDocument/2006/relationships" xmlns:p="http://schemas.openxmlformats.org/presentationml/2006/main">
+  <p:cSld>
+    <p:spTree>
+      <p:nvGrpSpPr>
+        <p:cNvPr id="1" name=""/>
+        <p:cNvGrpSpPr/>
+        <p:nvPr/>
+      </p:nvGrpSpPr>
+      <p:grpSpPr>
+        <a:xfrm>
+          <a:off x="0" y="0"/>
+          <a:ext cx="0" cy="0"/>
+          <a:chOff x="0" y="0"/>
+          <a:chExt cx="0" cy="0"/>
+        </a:xfrm>
+      </p:grpSpPr>
+      <p:sp>
+        <p:nvSpPr>
+          <p:cNvPr id="2" name="Title 1">
+            <a:extLst>
+              <a:ext uri="{FF2B5EF4-FFF2-40B4-BE49-F238E27FC236}">
                 <a16:creationId xmlns:a16="http://schemas.microsoft.com/office/drawing/2014/main" id="{E52CDFE9-6C3A-CC7F-9F5C-1B7CB381EE0E}"/>
               </a:ext>
             </a:extLst>
@@ -4131,7 +4945,7 @@
 </p:sld>
 </file>
 
-<file path=ppt/slides/slide7.xml><?xml version="1.0" encoding="utf-8"?>
+<file path=ppt/slides/slide8.xml><?xml version="1.0" encoding="utf-8"?>
 <p:sld xmlns:a="http://schemas.openxmlformats.org/drawingml/2006/main" xmlns:r="http://schemas.openxmlformats.org/officeDocument/2006/relationships" xmlns:p="http://schemas.openxmlformats.org/presentationml/2006/main">
   <p:cSld>
     <p:spTree>
@@ -4737,4 +5551,319 @@
     </a:ext>
   </a:extLst>
 </a:theme>
+</file>
+
+<file path=ppt/theme/theme2.xml><?xml version="1.0" encoding="utf-8"?>
+<a:theme xmlns:a="http://schemas.openxmlformats.org/drawingml/2006/main" name="Office Theme">
+  <a:themeElements>
+    <a:clrScheme name="Office">
+      <a:dk1>
+        <a:sysClr val="windowText" lastClr="000000"/>
+      </a:dk1>
+      <a:lt1>
+        <a:sysClr val="window" lastClr="FFFFFF"/>
+      </a:lt1>
+      <a:dk2>
+        <a:srgbClr val="0E2841"/>
+      </a:dk2>
+      <a:lt2>
+        <a:srgbClr val="E8E8E8"/>
+      </a:lt2>
+      <a:accent1>
+        <a:srgbClr val="156082"/>
+      </a:accent1>
+      <a:accent2>
+        <a:srgbClr val="E97132"/>
+      </a:accent2>
+      <a:accent3>
+        <a:srgbClr val="196B24"/>
+      </a:accent3>
+      <a:accent4>
+        <a:srgbClr val="0F9ED5"/>
+      </a:accent4>
+      <a:accent5>
+        <a:srgbClr val="A02B93"/>
+      </a:accent5>
+      <a:accent6>
+        <a:srgbClr val="4EA72E"/>
+      </a:accent6>
+      <a:hlink>
+        <a:srgbClr val="467886"/>
+      </a:hlink>
+      <a:folHlink>
+        <a:srgbClr val="96607D"/>
+      </a:folHlink>
+    </a:clrScheme>
+    <a:fontScheme name="Office">
+      <a:majorFont>
+        <a:latin typeface="Aptos Display" panose="02110004020202020204"/>
+        <a:ea typeface=""/>
+        <a:cs typeface=""/>
+        <a:font script="Jpan" typeface="游ゴシック Light"/>
+        <a:font script="Hang" typeface="맑은 고딕"/>
+        <a:font script="Hans" typeface="等线 Light"/>
+        <a:font script="Hant" typeface="新細明體"/>
+        <a:font script="Arab" typeface="Times New Roman"/>
+        <a:font script="Hebr" typeface="Times New Roman"/>
+        <a:font script="Thai" typeface="Angsana New"/>
+        <a:font script="Ethi" typeface="Nyala"/>
+        <a:font script="Beng" typeface="Vrinda"/>
+        <a:font script="Gujr" typeface="Shruti"/>
+        <a:font script="Khmr" typeface="MoolBoran"/>
+        <a:font script="Knda" typeface="Tunga"/>
+        <a:font script="Guru" typeface="Raavi"/>
+        <a:font script="Cans" typeface="Euphemia"/>
+        <a:font script="Cher" typeface="Plantagenet Cherokee"/>
+        <a:font script="Yiii" typeface="Microsoft Yi Baiti"/>
+        <a:font script="Tibt" typeface="Microsoft Himalaya"/>
+        <a:font script="Thaa" typeface="MV Boli"/>
+        <a:font script="Deva" typeface="Mangal"/>
+        <a:font script="Telu" typeface="Gautami"/>
+        <a:font script="Taml" typeface="Latha"/>
+        <a:font script="Syrc" typeface="Estrangelo Edessa"/>
+        <a:font script="Orya" typeface="Kalinga"/>
+        <a:font script="Mlym" typeface="Kartika"/>
+        <a:font script="Laoo" typeface="DokChampa"/>
+        <a:font script="Sinh" typeface="Iskoola Pota"/>
+        <a:font script="Mong" typeface="Mongolian Baiti"/>
+        <a:font script="Viet" typeface="Times New Roman"/>
+        <a:font script="Uigh" typeface="Microsoft Uighur"/>
+        <a:font script="Geor" typeface="Sylfaen"/>
+        <a:font script="Armn" typeface="Arial"/>
+        <a:font script="Bugi" typeface="Leelawadee UI"/>
+        <a:font script="Bopo" typeface="Microsoft JhengHei"/>
+        <a:font script="Java" typeface="Javanese Text"/>
+        <a:font script="Lisu" typeface="Segoe UI"/>
+        <a:font script="Mymr" typeface="Myanmar Text"/>
+        <a:font script="Nkoo" typeface="Ebrima"/>
+        <a:font script="Olck" typeface="Nirmala UI"/>
+        <a:font script="Osma" typeface="Ebrima"/>
+        <a:font script="Phag" typeface="Phagspa"/>
+        <a:font script="Syrn" typeface="Estrangelo Edessa"/>
+        <a:font script="Syrj" typeface="Estrangelo Edessa"/>
+        <a:font script="Syre" typeface="Estrangelo Edessa"/>
+        <a:font script="Sora" typeface="Nirmala UI"/>
+        <a:font script="Tale" typeface="Microsoft Tai Le"/>
+        <a:font script="Talu" typeface="Microsoft New Tai Lue"/>
+        <a:font script="Tfng" typeface="Ebrima"/>
+      </a:majorFont>
+      <a:minorFont>
+        <a:latin typeface="Aptos" panose="02110004020202020204"/>
+        <a:ea typeface=""/>
+        <a:cs typeface=""/>
+        <a:font script="Jpan" typeface="游ゴシック"/>
+        <a:font script="Hang" typeface="맑은 고딕"/>
+        <a:font script="Hans" typeface="等线"/>
+        <a:font script="Hant" typeface="新細明體"/>
+        <a:font script="Arab" typeface="Arial"/>
+        <a:font script="Hebr" typeface="Arial"/>
+        <a:font script="Thai" typeface="Cordia New"/>
+        <a:font script="Ethi" typeface="Nyala"/>
+        <a:font script="Beng" typeface="Vrinda"/>
+        <a:font script="Gujr" typeface="Shruti"/>
+        <a:font script="Khmr" typeface="DaunPenh"/>
+        <a:font script="Knda" typeface="Tunga"/>
+        <a:font script="Guru" typeface="Raavi"/>
+        <a:font script="Cans" typeface="Euphemia"/>
+        <a:font script="Cher" typeface="Plantagenet Cherokee"/>
+        <a:font script="Yiii" typeface="Microsoft Yi Baiti"/>
+        <a:font script="Tibt" typeface="Microsoft Himalaya"/>
+        <a:font script="Thaa" typeface="MV Boli"/>
+        <a:font script="Deva" typeface="Mangal"/>
+        <a:font script="Telu" typeface="Gautami"/>
+        <a:font script="Taml" typeface="Latha"/>
+        <a:font script="Syrc" typeface="Estrangelo Edessa"/>
+        <a:font script="Orya" typeface="Kalinga"/>
+        <a:font script="Mlym" typeface="Kartika"/>
+        <a:font script="Laoo" typeface="DokChampa"/>
+        <a:font script="Sinh" typeface="Iskoola Pota"/>
+        <a:font script="Mong" typeface="Mongolian Baiti"/>
+        <a:font script="Viet" typeface="Arial"/>
+        <a:font script="Uigh" typeface="Microsoft Uighur"/>
+        <a:font script="Geor" typeface="Sylfaen"/>
+        <a:font script="Armn" typeface="Arial"/>
+        <a:font script="Bugi" typeface="Leelawadee UI"/>
+        <a:font script="Bopo" typeface="Microsoft JhengHei"/>
+        <a:font script="Java" typeface="Javanese Text"/>
+        <a:font script="Lisu" typeface="Segoe UI"/>
+        <a:font script="Mymr" typeface="Myanmar Text"/>
+        <a:font script="Nkoo" typeface="Ebrima"/>
+        <a:font script="Olck" typeface="Nirmala UI"/>
+        <a:font script="Osma" typeface="Ebrima"/>
+        <a:font script="Phag" typeface="Phagspa"/>
+        <a:font script="Syrn" typeface="Estrangelo Edessa"/>
+        <a:font script="Syrj" typeface="Estrangelo Edessa"/>
+        <a:font script="Syre" typeface="Estrangelo Edessa"/>
+        <a:font script="Sora" typeface="Nirmala UI"/>
+        <a:font script="Tale" typeface="Microsoft Tai Le"/>
+        <a:font script="Talu" typeface="Microsoft New Tai Lue"/>
+        <a:font script="Tfng" typeface="Ebrima"/>
+      </a:minorFont>
+    </a:fontScheme>
+    <a:fmtScheme name="Office">
+      <a:fillStyleLst>
+        <a:solidFill>
+          <a:schemeClr val="phClr"/>
+        </a:solidFill>
+        <a:gradFill rotWithShape="1">
+          <a:gsLst>
+            <a:gs pos="0">
+              <a:schemeClr val="phClr">
+                <a:lumMod val="110000"/>
+                <a:satMod val="105000"/>
+                <a:tint val="67000"/>
+              </a:schemeClr>
+            </a:gs>
+            <a:gs pos="50000">
+              <a:schemeClr val="phClr">
+                <a:lumMod val="105000"/>
+                <a:satMod val="103000"/>
+                <a:tint val="73000"/>
+              </a:schemeClr>
+            </a:gs>
+            <a:gs pos="100000">
+              <a:schemeClr val="phClr">
+                <a:lumMod val="105000"/>
+                <a:satMod val="109000"/>
+                <a:tint val="81000"/>
+              </a:schemeClr>
+            </a:gs>
+          </a:gsLst>
+          <a:lin ang="5400000" scaled="0"/>
+        </a:gradFill>
+        <a:gradFill rotWithShape="1">
+          <a:gsLst>
+            <a:gs pos="0">
+              <a:schemeClr val="phClr">
+                <a:satMod val="103000"/>
+                <a:lumMod val="102000"/>
+                <a:tint val="94000"/>
+              </a:schemeClr>
+            </a:gs>
+            <a:gs pos="50000">
+              <a:schemeClr val="phClr">
+                <a:satMod val="110000"/>
+                <a:lumMod val="100000"/>
+                <a:shade val="100000"/>
+              </a:schemeClr>
+            </a:gs>
+            <a:gs pos="100000">
+              <a:schemeClr val="phClr">
+                <a:lumMod val="99000"/>
+                <a:satMod val="120000"/>
+                <a:shade val="78000"/>
+              </a:schemeClr>
+            </a:gs>
+          </a:gsLst>
+          <a:lin ang="5400000" scaled="0"/>
+        </a:gradFill>
+      </a:fillStyleLst>
+      <a:lnStyleLst>
+        <a:ln w="12700" cap="flat" cmpd="sng" algn="ctr">
+          <a:solidFill>
+            <a:schemeClr val="phClr"/>
+          </a:solidFill>
+          <a:prstDash val="solid"/>
+          <a:miter lim="800000"/>
+        </a:ln>
+        <a:ln w="19050" cap="flat" cmpd="sng" algn="ctr">
+          <a:solidFill>
+            <a:schemeClr val="phClr"/>
+          </a:solidFill>
+          <a:prstDash val="solid"/>
+          <a:miter lim="800000"/>
+        </a:ln>
+        <a:ln w="25400" cap="flat" cmpd="sng" algn="ctr">
+          <a:solidFill>
+            <a:schemeClr val="phClr"/>
+          </a:solidFill>
+          <a:prstDash val="solid"/>
+          <a:miter lim="800000"/>
+        </a:ln>
+      </a:lnStyleLst>
+      <a:effectStyleLst>
+        <a:effectStyle>
+          <a:effectLst/>
+        </a:effectStyle>
+        <a:effectStyle>
+          <a:effectLst/>
+        </a:effectStyle>
+        <a:effectStyle>
+          <a:effectLst>
+            <a:outerShdw blurRad="57150" dist="19050" dir="5400000" algn="ctr" rotWithShape="0">
+              <a:srgbClr val="000000">
+                <a:alpha val="63000"/>
+              </a:srgbClr>
+            </a:outerShdw>
+          </a:effectLst>
+        </a:effectStyle>
+      </a:effectStyleLst>
+      <a:bgFillStyleLst>
+        <a:solidFill>
+          <a:schemeClr val="phClr"/>
+        </a:solidFill>
+        <a:solidFill>
+          <a:schemeClr val="phClr">
+            <a:tint val="95000"/>
+            <a:satMod val="170000"/>
+          </a:schemeClr>
+        </a:solidFill>
+        <a:gradFill rotWithShape="1">
+          <a:gsLst>
+            <a:gs pos="0">
+              <a:schemeClr val="phClr">
+                <a:tint val="93000"/>
+                <a:satMod val="150000"/>
+                <a:shade val="98000"/>
+                <a:lumMod val="102000"/>
+              </a:schemeClr>
+            </a:gs>
+            <a:gs pos="50000">
+              <a:schemeClr val="phClr">
+                <a:tint val="98000"/>
+                <a:satMod val="130000"/>
+                <a:shade val="90000"/>
+                <a:lumMod val="103000"/>
+              </a:schemeClr>
+            </a:gs>
+            <a:gs pos="100000">
+              <a:schemeClr val="phClr">
+                <a:shade val="63000"/>
+                <a:satMod val="120000"/>
+              </a:schemeClr>
+            </a:gs>
+          </a:gsLst>
+          <a:lin ang="5400000" scaled="0"/>
+        </a:gradFill>
+      </a:bgFillStyleLst>
+    </a:fmtScheme>
+  </a:themeElements>
+  <a:objectDefaults>
+    <a:lnDef>
+      <a:spPr/>
+      <a:bodyPr/>
+      <a:lstStyle/>
+      <a:style>
+        <a:lnRef idx="2">
+          <a:schemeClr val="accent1"/>
+        </a:lnRef>
+        <a:fillRef idx="0">
+          <a:schemeClr val="accent1"/>
+        </a:fillRef>
+        <a:effectRef idx="1">
+          <a:schemeClr val="accent1"/>
+        </a:effectRef>
+        <a:fontRef idx="minor">
+          <a:schemeClr val="tx1"/>
+        </a:fontRef>
+      </a:style>
+    </a:lnDef>
+  </a:objectDefaults>
+  <a:extraClrSchemeLst/>
+  <a:extLst>
+    <a:ext uri="{05A4C25C-085E-4340-85A3-A5531E510DB2}">
+      <thm15:themeFamily xmlns:thm15="http://schemas.microsoft.com/office/thememl/2012/main" name="Office Theme" id="{2E142A2C-CD16-42D6-873A-C26D2A0506FA}" vid="{1BDDFF52-6CD6-40A5-AB3C-68EB2F1E4D0A}"/>
+    </a:ext>
+  </a:extLst>
+</a:theme>
 </file>
</xml_diff>